<commit_message>
Update presentation and move csv files to data subfolder
</commit_message>
<xml_diff>
--- a/data_handling_and_analysis/Python Workshop - Data Handling and Analysis.pptx
+++ b/data_handling_and_analysis/Python Workshop - Data Handling and Analysis.pptx
@@ -1,11 +1,11 @@
 
 <file path=ppt/presentation.xml><?xml version="1.0" encoding="utf-8"?>
-<p:presentation xmlns:a="http://schemas.openxmlformats.org/drawingml/2006/main" xmlns:r="http://schemas.openxmlformats.org/officeDocument/2006/relationships" xmlns:p="http://schemas.openxmlformats.org/presentationml/2006/main" saveSubsetFonts="1">
+<p:presentation xmlns:a="http://schemas.openxmlformats.org/drawingml/2006/main" xmlns:r="http://schemas.openxmlformats.org/officeDocument/2006/relationships" xmlns:p="http://schemas.openxmlformats.org/presentationml/2006/main" removePersonalInfoOnSave="1" saveSubsetFonts="1">
   <p:sldMasterIdLst>
     <p:sldMasterId id="2147483648" r:id="rId1"/>
   </p:sldMasterIdLst>
   <p:sldIdLst>
-    <p:sldId id="256" r:id="rId2"/>
+    <p:sldId id="270" r:id="rId2"/>
     <p:sldId id="261" r:id="rId3"/>
     <p:sldId id="260" r:id="rId4"/>
     <p:sldId id="267" r:id="rId5"/>
@@ -119,7 +119,7 @@
       <p14:sectionLst xmlns:p14="http://schemas.microsoft.com/office/powerpoint/2010/main">
         <p14:section name="Default Section" id="{A79AE930-CA20-432C-9619-FBFAD972BB02}">
           <p14:sldIdLst>
-            <p14:sldId id="256"/>
+            <p14:sldId id="270"/>
             <p14:sldId id="261"/>
             <p14:sldId id="260"/>
             <p14:sldId id="267"/>
@@ -272,7 +272,7 @@
           <a:p>
             <a:fld id="{DB2D40D2-DA59-418F-9676-2E287E608FAF}" type="datetimeFigureOut">
               <a:rPr lang="de-CH" smtClean="0"/>
-              <a:t>10.10.2020</a:t>
+              <a:t>29.10.2020</a:t>
             </a:fld>
             <a:endParaRPr lang="de-CH"/>
           </a:p>
@@ -442,7 +442,7 @@
           <a:p>
             <a:fld id="{DB2D40D2-DA59-418F-9676-2E287E608FAF}" type="datetimeFigureOut">
               <a:rPr lang="de-CH" smtClean="0"/>
-              <a:t>10.10.2020</a:t>
+              <a:t>29.10.2020</a:t>
             </a:fld>
             <a:endParaRPr lang="de-CH"/>
           </a:p>
@@ -622,7 +622,7 @@
           <a:p>
             <a:fld id="{DB2D40D2-DA59-418F-9676-2E287E608FAF}" type="datetimeFigureOut">
               <a:rPr lang="de-CH" smtClean="0"/>
-              <a:t>10.10.2020</a:t>
+              <a:t>29.10.2020</a:t>
             </a:fld>
             <a:endParaRPr lang="de-CH"/>
           </a:p>
@@ -792,7 +792,7 @@
           <a:p>
             <a:fld id="{DB2D40D2-DA59-418F-9676-2E287E608FAF}" type="datetimeFigureOut">
               <a:rPr lang="de-CH" smtClean="0"/>
-              <a:t>10.10.2020</a:t>
+              <a:t>29.10.2020</a:t>
             </a:fld>
             <a:endParaRPr lang="de-CH"/>
           </a:p>
@@ -1038,7 +1038,7 @@
           <a:p>
             <a:fld id="{DB2D40D2-DA59-418F-9676-2E287E608FAF}" type="datetimeFigureOut">
               <a:rPr lang="de-CH" smtClean="0"/>
-              <a:t>10.10.2020</a:t>
+              <a:t>29.10.2020</a:t>
             </a:fld>
             <a:endParaRPr lang="de-CH"/>
           </a:p>
@@ -1270,7 +1270,7 @@
           <a:p>
             <a:fld id="{DB2D40D2-DA59-418F-9676-2E287E608FAF}" type="datetimeFigureOut">
               <a:rPr lang="de-CH" smtClean="0"/>
-              <a:t>10.10.2020</a:t>
+              <a:t>29.10.2020</a:t>
             </a:fld>
             <a:endParaRPr lang="de-CH"/>
           </a:p>
@@ -1637,7 +1637,7 @@
           <a:p>
             <a:fld id="{DB2D40D2-DA59-418F-9676-2E287E608FAF}" type="datetimeFigureOut">
               <a:rPr lang="de-CH" smtClean="0"/>
-              <a:t>10.10.2020</a:t>
+              <a:t>29.10.2020</a:t>
             </a:fld>
             <a:endParaRPr lang="de-CH"/>
           </a:p>
@@ -1755,7 +1755,7 @@
           <a:p>
             <a:fld id="{DB2D40D2-DA59-418F-9676-2E287E608FAF}" type="datetimeFigureOut">
               <a:rPr lang="de-CH" smtClean="0"/>
-              <a:t>10.10.2020</a:t>
+              <a:t>29.10.2020</a:t>
             </a:fld>
             <a:endParaRPr lang="de-CH"/>
           </a:p>
@@ -1850,7 +1850,7 @@
           <a:p>
             <a:fld id="{DB2D40D2-DA59-418F-9676-2E287E608FAF}" type="datetimeFigureOut">
               <a:rPr lang="de-CH" smtClean="0"/>
-              <a:t>10.10.2020</a:t>
+              <a:t>29.10.2020</a:t>
             </a:fld>
             <a:endParaRPr lang="de-CH"/>
           </a:p>
@@ -2127,7 +2127,7 @@
           <a:p>
             <a:fld id="{DB2D40D2-DA59-418F-9676-2E287E608FAF}" type="datetimeFigureOut">
               <a:rPr lang="de-CH" smtClean="0"/>
-              <a:t>10.10.2020</a:t>
+              <a:t>29.10.2020</a:t>
             </a:fld>
             <a:endParaRPr lang="de-CH"/>
           </a:p>
@@ -2380,7 +2380,7 @@
           <a:p>
             <a:fld id="{DB2D40D2-DA59-418F-9676-2E287E608FAF}" type="datetimeFigureOut">
               <a:rPr lang="de-CH" smtClean="0"/>
-              <a:t>10.10.2020</a:t>
+              <a:t>29.10.2020</a:t>
             </a:fld>
             <a:endParaRPr lang="de-CH"/>
           </a:p>
@@ -2593,7 +2593,7 @@
           <a:p>
             <a:fld id="{DB2D40D2-DA59-418F-9676-2E287E608FAF}" type="datetimeFigureOut">
               <a:rPr lang="de-CH" smtClean="0"/>
-              <a:t>10.10.2020</a:t>
+              <a:t>29.10.2020</a:t>
             </a:fld>
             <a:endParaRPr lang="de-CH"/>
           </a:p>
@@ -3010,8 +3010,8 @@
         </p:nvSpPr>
         <p:spPr>
           <a:xfrm>
-            <a:off x="1524000" y="3607900"/>
-            <a:ext cx="9144000" cy="1655762"/>
+            <a:off x="1523997" y="2995399"/>
+            <a:ext cx="9144000" cy="2461006"/>
           </a:xfrm>
         </p:spPr>
         <p:txBody>
@@ -3021,10 +3021,27 @@
           <a:lstStyle/>
           <a:p>
             <a:r>
-              <a:rPr lang="en-US" sz="2800" dirty="0"/>
-              <a:t>FAIM Python Workshop II – Data Handling and Analysis</a:t>
-            </a:r>
-            <a:endParaRPr lang="de-CH" sz="2800" dirty="0"/>
+              <a:rPr lang="en-US" sz="3200" dirty="0"/>
+              <a:t>FAIM Python Course – Session 2</a:t>
+            </a:r>
+          </a:p>
+          <a:p>
+            <a:r>
+              <a:rPr lang="en-US" sz="3200" dirty="0"/>
+              <a:t>Data Handling &amp; Analysis</a:t>
+            </a:r>
+          </a:p>
+          <a:p>
+            <a:endParaRPr lang="en-US" sz="2600" dirty="0"/>
+          </a:p>
+          <a:p>
+            <a:r>
+              <a:rPr lang="de-CH" dirty="0">
+                <a:hlinkClick r:id="rId2"/>
+              </a:rPr>
+              <a:t>benjamin.titze@fmi.ch</a:t>
+            </a:r>
+            <a:endParaRPr lang="de-CH" dirty="0"/>
           </a:p>
         </p:txBody>
       </p:sp>
@@ -3037,7 +3054,7 @@
           <p:nvPr/>
         </p:nvPicPr>
         <p:blipFill>
-          <a:blip r:embed="rId2">
+          <a:blip r:embed="rId3">
             <a:extLst>
               <a:ext uri="{28A0092B-C50C-407E-A947-70E740481C1C}">
                 <a14:useLocalDpi xmlns:a14="http://schemas.microsoft.com/office/drawing/2010/main" val="0"/>
@@ -3050,8 +3067,8 @@
         </p:blipFill>
         <p:spPr>
           <a:xfrm>
-            <a:off x="3830573" y="1972005"/>
-            <a:ext cx="4530854" cy="1530388"/>
+            <a:off x="3998084" y="1578173"/>
+            <a:ext cx="4195827" cy="1417226"/>
           </a:xfrm>
           <a:prstGeom prst="rect">
             <a:avLst/>
@@ -3066,8 +3083,8 @@
         </p:nvSpPr>
         <p:spPr>
           <a:xfrm>
-            <a:off x="7995139" y="6394939"/>
-            <a:ext cx="4079631" cy="369332"/>
+            <a:off x="10348686" y="6455899"/>
+            <a:ext cx="1773014" cy="338554"/>
           </a:xfrm>
           <a:prstGeom prst="rect">
             <a:avLst/>
@@ -3082,16 +3099,16 @@
           <a:p>
             <a:pPr algn="r"/>
             <a:r>
-              <a:rPr lang="en-US" dirty="0">
+              <a:rPr lang="en-US" sz="1600" dirty="0">
                 <a:solidFill>
                   <a:schemeClr val="bg1">
                     <a:lumMod val="65000"/>
                   </a:schemeClr>
                 </a:solidFill>
               </a:rPr>
-              <a:t>27 August 2019 | benjamin.titze@fmi.ch</a:t>
-            </a:r>
-            <a:endParaRPr lang="de-CH" dirty="0">
+              <a:t>29 October 2020</a:t>
+            </a:r>
+            <a:endParaRPr lang="de-CH" sz="1600" dirty="0">
               <a:solidFill>
                 <a:schemeClr val="bg1">
                   <a:lumMod val="65000"/>
@@ -3101,10 +3118,58 @@
           </a:p>
         </p:txBody>
       </p:sp>
+      <p:sp>
+        <p:nvSpPr>
+          <p:cNvPr id="10" name="TextBox 9">
+            <a:extLst>
+              <a:ext uri="{FF2B5EF4-FFF2-40B4-BE49-F238E27FC236}">
+                <a16:creationId xmlns:a16="http://schemas.microsoft.com/office/drawing/2014/main" id="{2165A71C-5DF7-4DBA-A4E6-049AD129B4A1}"/>
+              </a:ext>
+            </a:extLst>
+          </p:cNvPr>
+          <p:cNvSpPr txBox="1"/>
+          <p:nvPr/>
+        </p:nvSpPr>
+        <p:spPr>
+          <a:xfrm>
+            <a:off x="70300" y="6455899"/>
+            <a:ext cx="6096000" cy="338554"/>
+          </a:xfrm>
+          <a:prstGeom prst="rect">
+            <a:avLst/>
+          </a:prstGeom>
+          <a:noFill/>
+        </p:spPr>
+        <p:txBody>
+          <a:bodyPr wrap="square">
+            <a:spAutoFit/>
+          </a:bodyPr>
+          <a:lstStyle/>
+          <a:p>
+            <a:r>
+              <a:rPr lang="en-US" sz="1600" dirty="0">
+                <a:solidFill>
+                  <a:schemeClr val="bg1">
+                    <a:lumMod val="65000"/>
+                  </a:schemeClr>
+                </a:solidFill>
+              </a:rPr>
+              <a:t>Facility for Advanced Imaging and Microscopy (FAIM)</a:t>
+            </a:r>
+            <a:endParaRPr lang="de-CH" sz="1600" dirty="0">
+              <a:solidFill>
+                <a:schemeClr val="bg1">
+                  <a:lumMod val="65000"/>
+                </a:schemeClr>
+              </a:solidFill>
+            </a:endParaRPr>
+          </a:p>
+        </p:txBody>
+      </p:sp>
     </p:spTree>
     <p:extLst>
       <p:ext uri="{BB962C8B-B14F-4D97-AF65-F5344CB8AC3E}">
-        <p14:creationId xmlns:p14="http://schemas.microsoft.com/office/powerpoint/2010/main" val="664846721"/>
+        <p14:creationId xmlns:p14="http://schemas.microsoft.com/office/powerpoint/2010/main" val="4226861242"/>
       </p:ext>
     </p:extLst>
   </p:cSld>
@@ -3143,7 +3208,7 @@
         </p:nvSpPr>
         <p:spPr>
           <a:xfrm>
-            <a:off x="838200" y="2616929"/>
+            <a:off x="838200" y="2369405"/>
             <a:ext cx="10515600" cy="2119190"/>
           </a:xfrm>
         </p:spPr>
@@ -3189,8 +3254,14 @@
             </a:pPr>
             <a:r>
               <a:rPr lang="en-US" dirty="0"/>
-              <a:t>+ exercise with example dataset</a:t>
-            </a:r>
+              <a:t>+ hands-on exercise with example dataset</a:t>
+            </a:r>
+          </a:p>
+          <a:p>
+            <a:pPr marL="0" indent="0" algn="ctr">
+              <a:buNone/>
+            </a:pPr>
+            <a:endParaRPr lang="en-US" dirty="0"/>
           </a:p>
           <a:p>
             <a:pPr marL="0" indent="0" algn="ctr">
@@ -3293,8 +3364,12 @@
               <a:buNone/>
             </a:pPr>
             <a:r>
+              <a:rPr lang="en-US" sz="2400"/>
+              <a:t>For the hands-on </a:t>
+            </a:r>
+            <a:r>
               <a:rPr lang="en-US" sz="2400" dirty="0"/>
-              <a:t>Load this dataset with pandas and explore it:</a:t>
+              <a:t>exercise, load the dataset with pandas and explore it:</a:t>
             </a:r>
             <a:endParaRPr lang="de-CH" sz="2400" dirty="0"/>
           </a:p>
@@ -3303,12 +3378,8 @@
               <a:buNone/>
             </a:pPr>
             <a:r>
-              <a:rPr lang="de-CH" sz="2400"/>
-              <a:t>movies</a:t>
-            </a:r>
-            <a:r>
               <a:rPr lang="de-CH" sz="2400" dirty="0"/>
-              <a:t>_dataset.csv</a:t>
+              <a:t>movies_dataset.csv</a:t>
             </a:r>
           </a:p>
           <a:p>
@@ -3322,7 +3393,16 @@
               <a:buNone/>
             </a:pPr>
             <a:r>
-              <a:rPr lang="de-CH" sz="1800" dirty="0"/>
+              <a:rPr lang="de-CH" sz="1800" dirty="0">
+                <a:effectLst>
+                  <a:outerShdw blurRad="38100" dist="38100" dir="2700000" algn="tl">
+                    <a:srgbClr val="000000">
+                      <a:alpha val="43137"/>
+                    </a:srgbClr>
+                  </a:outerShdw>
+                </a:effectLst>
+                <a:latin typeface="Consolas" panose="020B0609020204030204" pitchFamily="49" charset="0"/>
+              </a:rPr>
               <a:t>import pandas as pd</a:t>
             </a:r>
           </a:p>
@@ -3331,15 +3411,42 @@
               <a:buNone/>
             </a:pPr>
             <a:r>
-              <a:rPr lang="en-US" sz="1800" dirty="0"/>
+              <a:rPr lang="en-US" sz="1800" dirty="0">
+                <a:effectLst>
+                  <a:outerShdw blurRad="38100" dist="38100" dir="2700000" algn="tl">
+                    <a:srgbClr val="000000">
+                      <a:alpha val="43137"/>
+                    </a:srgbClr>
+                  </a:outerShdw>
+                </a:effectLst>
+                <a:latin typeface="Consolas" panose="020B0609020204030204" pitchFamily="49" charset="0"/>
+              </a:rPr>
               <a:t>df = </a:t>
             </a:r>
             <a:r>
-              <a:rPr lang="en-US" sz="1800" dirty="0" err="1"/>
+              <a:rPr lang="en-US" sz="1800" dirty="0" err="1">
+                <a:effectLst>
+                  <a:outerShdw blurRad="38100" dist="38100" dir="2700000" algn="tl">
+                    <a:srgbClr val="000000">
+                      <a:alpha val="43137"/>
+                    </a:srgbClr>
+                  </a:outerShdw>
+                </a:effectLst>
+                <a:latin typeface="Consolas" panose="020B0609020204030204" pitchFamily="49" charset="0"/>
+              </a:rPr>
               <a:t>pd.read_csv</a:t>
             </a:r>
             <a:r>
-              <a:rPr lang="en-US" sz="1800" dirty="0"/>
+              <a:rPr lang="en-US" sz="1800" dirty="0">
+                <a:effectLst>
+                  <a:outerShdw blurRad="38100" dist="38100" dir="2700000" algn="tl">
+                    <a:srgbClr val="000000">
+                      <a:alpha val="43137"/>
+                    </a:srgbClr>
+                  </a:outerShdw>
+                </a:effectLst>
+                <a:latin typeface="Consolas" panose="020B0609020204030204" pitchFamily="49" charset="0"/>
+              </a:rPr>
               <a:t>(…)</a:t>
             </a:r>
           </a:p>
@@ -3348,11 +3455,29 @@
               <a:buNone/>
             </a:pPr>
             <a:r>
-              <a:rPr lang="en-US" sz="1800" dirty="0" err="1"/>
+              <a:rPr lang="en-US" sz="1800" dirty="0" err="1">
+                <a:effectLst>
+                  <a:outerShdw blurRad="38100" dist="38100" dir="2700000" algn="tl">
+                    <a:srgbClr val="000000">
+                      <a:alpha val="43137"/>
+                    </a:srgbClr>
+                  </a:outerShdw>
+                </a:effectLst>
+                <a:latin typeface="Consolas" panose="020B0609020204030204" pitchFamily="49" charset="0"/>
+              </a:rPr>
               <a:t>df.head</a:t>
             </a:r>
             <a:r>
-              <a:rPr lang="en-US" sz="1800" dirty="0"/>
+              <a:rPr lang="en-US" sz="1800" dirty="0">
+                <a:effectLst>
+                  <a:outerShdw blurRad="38100" dist="38100" dir="2700000" algn="tl">
+                    <a:srgbClr val="000000">
+                      <a:alpha val="43137"/>
+                    </a:srgbClr>
+                  </a:outerShdw>
+                </a:effectLst>
+                <a:latin typeface="Consolas" panose="020B0609020204030204" pitchFamily="49" charset="0"/>
+              </a:rPr>
               <a:t>(…)</a:t>
             </a:r>
           </a:p>
@@ -3361,7 +3486,16 @@
               <a:buNone/>
             </a:pPr>
             <a:r>
-              <a:rPr lang="en-US" sz="1800" dirty="0"/>
+              <a:rPr lang="en-US" sz="1800" dirty="0">
+                <a:effectLst>
+                  <a:outerShdw blurRad="38100" dist="38100" dir="2700000" algn="tl">
+                    <a:srgbClr val="000000">
+                      <a:alpha val="43137"/>
+                    </a:srgbClr>
+                  </a:outerShdw>
+                </a:effectLst>
+                <a:latin typeface="Consolas" panose="020B0609020204030204" pitchFamily="49" charset="0"/>
+              </a:rPr>
               <a:t>…</a:t>
             </a:r>
           </a:p>
@@ -3409,8 +3543,8 @@
         </p:nvSpPr>
         <p:spPr>
           <a:xfrm>
-            <a:off x="838200" y="365126"/>
-            <a:ext cx="10515600" cy="871660"/>
+            <a:off x="660642" y="347370"/>
+            <a:ext cx="10515600" cy="700194"/>
           </a:xfrm>
         </p:spPr>
         <p:txBody>
@@ -3437,19 +3571,22 @@
         </p:nvSpPr>
         <p:spPr>
           <a:xfrm>
-            <a:off x="838200" y="1626333"/>
-            <a:ext cx="9823938" cy="4351338"/>
+            <a:off x="660642" y="1376038"/>
+            <a:ext cx="9823938" cy="5099080"/>
           </a:xfrm>
         </p:spPr>
         <p:txBody>
           <a:bodyPr>
-            <a:normAutofit lnSpcReduction="10000"/>
+            <a:noAutofit/>
           </a:bodyPr>
           <a:lstStyle/>
           <a:p>
+            <a:pPr marL="0" indent="0">
+              <a:buNone/>
+            </a:pPr>
             <a:r>
               <a:rPr lang="en-US" sz="2200" dirty="0"/>
-              <a:t>Prerequisites: Python 3.6, </a:t>
+              <a:t>Prerequisites: Python 3.6+, </a:t>
             </a:r>
             <a:r>
               <a:rPr lang="en-US" sz="2200" dirty="0" err="1"/>
@@ -3457,29 +3594,8 @@
             </a:r>
             <a:r>
               <a:rPr lang="en-US" sz="2200" dirty="0"/>
-              <a:t> Notebook, </a:t>
-            </a:r>
-            <a:r>
-              <a:rPr lang="en-US" sz="2200" dirty="0" err="1"/>
-              <a:t>numpy</a:t>
-            </a:r>
-            <a:r>
-              <a:rPr lang="en-US" sz="2200" dirty="0"/>
-              <a:t>, </a:t>
-            </a:r>
-            <a:r>
-              <a:rPr lang="en-US" sz="2200" dirty="0" err="1"/>
-              <a:t>scipy</a:t>
-            </a:r>
-            <a:r>
-              <a:rPr lang="en-US" sz="2200" dirty="0"/>
-              <a:t>, pandas, </a:t>
-            </a:r>
-            <a:r>
-              <a:rPr lang="en-US" sz="2200" dirty="0" err="1"/>
-              <a:t>matplotlib</a:t>
-            </a:r>
-            <a:endParaRPr lang="en-US" sz="2200" dirty="0"/>
+              <a:t> Notebook, NumPy, SciPy, pandas, Matplotlib</a:t>
+            </a:r>
           </a:p>
           <a:p>
             <a:pPr lvl="1"/>
@@ -3501,27 +3617,63 @@
             </a:r>
             <a:r>
               <a:rPr lang="en-US" sz="1800" dirty="0"/>
-              <a:t> Notebook? </a:t>
-            </a:r>
-          </a:p>
-          <a:p>
+              <a:t> Notebook?</a:t>
+            </a:r>
+          </a:p>
+          <a:p>
+            <a:pPr lvl="1"/>
+            <a:r>
+              <a:rPr lang="en-US" sz="1800" dirty="0"/>
+              <a:t>You may need to install the required packages: </a:t>
+            </a:r>
+            <a:r>
+              <a:rPr lang="en-US" sz="1800" dirty="0">
+                <a:effectLst>
+                  <a:outerShdw blurRad="38100" dist="38100" dir="2700000" algn="tl">
+                    <a:srgbClr val="000000">
+                      <a:alpha val="43137"/>
+                    </a:srgbClr>
+                  </a:outerShdw>
+                </a:effectLst>
+                <a:latin typeface="Consolas" panose="020B0609020204030204" pitchFamily="49" charset="0"/>
+              </a:rPr>
+              <a:t>pip install </a:t>
+            </a:r>
+            <a:r>
+              <a:rPr lang="en-US" sz="1800" dirty="0" err="1">
+                <a:effectLst>
+                  <a:outerShdw blurRad="38100" dist="38100" dir="2700000" algn="tl">
+                    <a:srgbClr val="000000">
+                      <a:alpha val="43137"/>
+                    </a:srgbClr>
+                  </a:outerShdw>
+                </a:effectLst>
+                <a:latin typeface="Consolas" panose="020B0609020204030204" pitchFamily="49" charset="0"/>
+              </a:rPr>
+              <a:t>numpy</a:t>
+            </a:r>
+            <a:r>
+              <a:rPr lang="en-US" sz="1800" dirty="0"/>
+              <a:t>, … </a:t>
+            </a:r>
+          </a:p>
+          <a:p>
+            <a:pPr marL="0" indent="0">
+              <a:spcBef>
+                <a:spcPts val="1800"/>
+              </a:spcBef>
+              <a:buNone/>
+            </a:pPr>
             <a:r>
               <a:rPr lang="en-US" sz="2200" dirty="0"/>
-              <a:t>How Python handles data</a:t>
+              <a:t>I. How Python handles data</a:t>
             </a:r>
           </a:p>
           <a:p>
             <a:pPr lvl="1"/>
             <a:r>
               <a:rPr lang="en-US" sz="1800" dirty="0"/>
-              <a:t>Basic data types</a:t>
-            </a:r>
-          </a:p>
-          <a:p>
-            <a:pPr lvl="1"/>
-            <a:r>
-              <a:rPr lang="en-US" sz="1800" dirty="0"/>
-              <a:t>Immutable and mutable objects</a:t>
+              <a:t>Data types / Immutable and mutable objects</a:t>
             </a:r>
           </a:p>
           <a:p>
@@ -3532,58 +3684,41 @@
             </a:r>
           </a:p>
           <a:p>
+            <a:pPr marL="0" indent="0">
+              <a:spcBef>
+                <a:spcPts val="1800"/>
+              </a:spcBef>
+              <a:buNone/>
+            </a:pPr>
             <a:r>
               <a:rPr lang="en-US" sz="2200" dirty="0"/>
-              <a:t>Brief intros to the core Python data science libraries </a:t>
+              <a:t>II. Brief intros to the core Python data science libraries </a:t>
             </a:r>
           </a:p>
           <a:p>
             <a:pPr lvl="1"/>
             <a:r>
               <a:rPr lang="en-US" sz="1800" dirty="0"/>
-              <a:t>Processing and </a:t>
-            </a:r>
-            <a:r>
-              <a:rPr lang="en-US" sz="1800" dirty="0" err="1"/>
-              <a:t>analysing</a:t>
-            </a:r>
+              <a:t>Processing data with NumPy, SciPy and pandas</a:t>
+            </a:r>
+          </a:p>
+          <a:p>
+            <a:pPr lvl="1"/>
             <a:r>
               <a:rPr lang="en-US" sz="1800" dirty="0"/>
-              <a:t> data with </a:t>
-            </a:r>
-            <a:r>
-              <a:rPr lang="en-US" sz="1800" dirty="0" err="1"/>
-              <a:t>NumPy</a:t>
-            </a:r>
-            <a:r>
-              <a:rPr lang="en-US" sz="1800" dirty="0"/>
-              <a:t>, </a:t>
-            </a:r>
-            <a:r>
-              <a:rPr lang="en-US" sz="1800" dirty="0" err="1"/>
-              <a:t>SciPy</a:t>
-            </a:r>
-            <a:r>
-              <a:rPr lang="en-US" sz="1800" dirty="0"/>
-              <a:t> and pandas</a:t>
-            </a:r>
-          </a:p>
-          <a:p>
-            <a:pPr lvl="1"/>
-            <a:r>
-              <a:rPr lang="en-US" sz="1800" dirty="0"/>
-              <a:t>Visualization with </a:t>
-            </a:r>
-            <a:r>
-              <a:rPr lang="en-US" sz="1800" dirty="0" err="1"/>
-              <a:t>matplotlib</a:t>
-            </a:r>
-            <a:endParaRPr lang="en-US" sz="1800" dirty="0"/>
-          </a:p>
-          <a:p>
+              <a:t>Visualization with Matplotlib</a:t>
+            </a:r>
+          </a:p>
+          <a:p>
+            <a:pPr marL="0" indent="0">
+              <a:spcBef>
+                <a:spcPts val="1800"/>
+              </a:spcBef>
+              <a:buNone/>
+            </a:pPr>
             <a:r>
               <a:rPr lang="en-US" sz="2200" dirty="0"/>
-              <a:t>Working with an example dataset</a:t>
+              <a:t>III. Working with an example dataset (a movie database)</a:t>
             </a:r>
           </a:p>
           <a:p>
@@ -3597,8 +3732,8 @@
               <a:buNone/>
             </a:pPr>
             <a:r>
-              <a:rPr lang="en-US" sz="2200" dirty="0"/>
-              <a:t>Duration: ~90 min</a:t>
+              <a:rPr lang="en-US" sz="2200" i="1" dirty="0"/>
+              <a:t>Duration: ~90 min, max. 2h</a:t>
             </a:r>
           </a:p>
         </p:txBody>
@@ -3649,7 +3784,7 @@
                                         <p:tgtEl>
                                           <p:spTgt spid="3">
                                             <p:txEl>
-                                              <p:pRg st="2" end="2"/>
+                                              <p:pRg st="3" end="3"/>
                                             </p:txEl>
                                           </p:spTgt>
                                         </p:tgtEl>
@@ -3680,7 +3815,7 @@
                                         <p:tgtEl>
                                           <p:spTgt spid="3">
                                             <p:txEl>
-                                              <p:pRg st="3" end="3"/>
+                                              <p:pRg st="4" end="4"/>
                                             </p:txEl>
                                           </p:spTgt>
                                         </p:tgtEl>
@@ -3711,37 +3846,6 @@
                                         <p:tgtEl>
                                           <p:spTgt spid="3">
                                             <p:txEl>
-                                              <p:pRg st="4" end="4"/>
-                                            </p:txEl>
-                                          </p:spTgt>
-                                        </p:tgtEl>
-                                        <p:attrNameLst>
-                                          <p:attrName>style.visibility</p:attrName>
-                                        </p:attrNameLst>
-                                      </p:cBhvr>
-                                      <p:to>
-                                        <p:strVal val="visible"/>
-                                      </p:to>
-                                    </p:set>
-                                  </p:childTnLst>
-                                </p:cTn>
-                              </p:par>
-                              <p:par>
-                                <p:cTn id="11" presetID="1" presetClass="entr" presetSubtype="0" fill="hold" nodeType="withEffect">
-                                  <p:stCondLst>
-                                    <p:cond delay="0"/>
-                                  </p:stCondLst>
-                                  <p:childTnLst>
-                                    <p:set>
-                                      <p:cBhvr>
-                                        <p:cTn id="12" dur="1" fill="hold">
-                                          <p:stCondLst>
-                                            <p:cond delay="0"/>
-                                          </p:stCondLst>
-                                        </p:cTn>
-                                        <p:tgtEl>
-                                          <p:spTgt spid="3">
-                                            <p:txEl>
                                               <p:pRg st="5" end="5"/>
                                             </p:txEl>
                                           </p:spTgt>
@@ -3764,19 +3868,50 @@
                     </p:cTn>
                   </p:par>
                   <p:par>
-                    <p:cTn id="13" fill="hold">
+                    <p:cTn id="11" fill="hold">
                       <p:stCondLst>
                         <p:cond delay="indefinite"/>
                       </p:stCondLst>
                       <p:childTnLst>
                         <p:par>
-                          <p:cTn id="14" fill="hold">
+                          <p:cTn id="12" fill="hold">
                             <p:stCondLst>
                               <p:cond delay="0"/>
                             </p:stCondLst>
                             <p:childTnLst>
                               <p:par>
-                                <p:cTn id="15" presetID="1" presetClass="entr" presetSubtype="0" fill="hold" nodeType="clickEffect">
+                                <p:cTn id="13" presetID="1" presetClass="entr" presetSubtype="0" fill="hold" nodeType="clickEffect">
+                                  <p:stCondLst>
+                                    <p:cond delay="0"/>
+                                  </p:stCondLst>
+                                  <p:childTnLst>
+                                    <p:set>
+                                      <p:cBhvr>
+                                        <p:cTn id="14" dur="1" fill="hold">
+                                          <p:stCondLst>
+                                            <p:cond delay="0"/>
+                                          </p:stCondLst>
+                                        </p:cTn>
+                                        <p:tgtEl>
+                                          <p:spTgt spid="3">
+                                            <p:txEl>
+                                              <p:pRg st="6" end="6"/>
+                                            </p:txEl>
+                                          </p:spTgt>
+                                        </p:tgtEl>
+                                        <p:attrNameLst>
+                                          <p:attrName>style.visibility</p:attrName>
+                                        </p:attrNameLst>
+                                      </p:cBhvr>
+                                      <p:to>
+                                        <p:strVal val="visible"/>
+                                      </p:to>
+                                    </p:set>
+                                  </p:childTnLst>
+                                </p:cTn>
+                              </p:par>
+                              <p:par>
+                                <p:cTn id="15" presetID="1" presetClass="entr" presetSubtype="0" fill="hold" nodeType="withEffect">
                                   <p:stCondLst>
                                     <p:cond delay="0"/>
                                   </p:stCondLst>
@@ -3791,7 +3926,7 @@
                                         <p:tgtEl>
                                           <p:spTgt spid="3">
                                             <p:txEl>
-                                              <p:pRg st="6" end="6"/>
+                                              <p:pRg st="7" end="7"/>
                                             </p:txEl>
                                           </p:spTgt>
                                         </p:tgtEl>
@@ -3822,37 +3957,6 @@
                                         <p:tgtEl>
                                           <p:spTgt spid="3">
                                             <p:txEl>
-                                              <p:pRg st="7" end="7"/>
-                                            </p:txEl>
-                                          </p:spTgt>
-                                        </p:tgtEl>
-                                        <p:attrNameLst>
-                                          <p:attrName>style.visibility</p:attrName>
-                                        </p:attrNameLst>
-                                      </p:cBhvr>
-                                      <p:to>
-                                        <p:strVal val="visible"/>
-                                      </p:to>
-                                    </p:set>
-                                  </p:childTnLst>
-                                </p:cTn>
-                              </p:par>
-                              <p:par>
-                                <p:cTn id="19" presetID="1" presetClass="entr" presetSubtype="0" fill="hold" nodeType="withEffect">
-                                  <p:stCondLst>
-                                    <p:cond delay="0"/>
-                                  </p:stCondLst>
-                                  <p:childTnLst>
-                                    <p:set>
-                                      <p:cBhvr>
-                                        <p:cTn id="20" dur="1" fill="hold">
-                                          <p:stCondLst>
-                                            <p:cond delay="0"/>
-                                          </p:stCondLst>
-                                        </p:cTn>
-                                        <p:tgtEl>
-                                          <p:spTgt spid="3">
-                                            <p:txEl>
                                               <p:pRg st="8" end="8"/>
                                             </p:txEl>
                                           </p:spTgt>
@@ -3875,26 +3979,26 @@
                     </p:cTn>
                   </p:par>
                   <p:par>
-                    <p:cTn id="21" fill="hold">
+                    <p:cTn id="19" fill="hold">
                       <p:stCondLst>
                         <p:cond delay="indefinite"/>
                       </p:stCondLst>
                       <p:childTnLst>
                         <p:par>
-                          <p:cTn id="22" fill="hold">
+                          <p:cTn id="20" fill="hold">
                             <p:stCondLst>
                               <p:cond delay="0"/>
                             </p:stCondLst>
                             <p:childTnLst>
                               <p:par>
-                                <p:cTn id="23" presetID="1" presetClass="entr" presetSubtype="0" fill="hold" nodeType="clickEffect">
+                                <p:cTn id="21" presetID="1" presetClass="entr" presetSubtype="0" fill="hold" nodeType="clickEffect">
                                   <p:stCondLst>
                                     <p:cond delay="0"/>
                                   </p:stCondLst>
                                   <p:childTnLst>
                                     <p:set>
                                       <p:cBhvr>
-                                        <p:cTn id="24" dur="1" fill="hold">
+                                        <p:cTn id="22" dur="1" fill="hold">
                                           <p:stCondLst>
                                             <p:cond delay="0"/>
                                           </p:stCondLst>
@@ -3918,14 +4022,14 @@
                                 </p:cTn>
                               </p:par>
                               <p:par>
-                                <p:cTn id="25" presetID="1" presetClass="entr" presetSubtype="0" fill="hold" nodeType="withEffect">
+                                <p:cTn id="23" presetID="1" presetClass="entr" presetSubtype="0" fill="hold" nodeType="withEffect">
                                   <p:stCondLst>
                                     <p:cond delay="0"/>
                                   </p:stCondLst>
                                   <p:childTnLst>
                                     <p:set>
                                       <p:cBhvr>
-                                        <p:cTn id="26" dur="1" fill="hold">
+                                        <p:cTn id="24" dur="1" fill="hold">
                                           <p:stCondLst>
                                             <p:cond delay="0"/>
                                           </p:stCondLst>
@@ -4129,7 +4233,7 @@
               <a:rPr lang="en-US" dirty="0">
                 <a:cs typeface="Consolas" panose="020B0609020204030204" pitchFamily="49" charset="0"/>
               </a:rPr>
-              <a:t>or launch via Anaconda navigator</a:t>
+              <a:t>or launch via Anaconda Navigator.</a:t>
             </a:r>
           </a:p>
         </p:txBody>
@@ -4219,7 +4323,7 @@
         </p:blipFill>
         <p:spPr>
           <a:xfrm>
-            <a:off x="5281247" y="1160584"/>
+            <a:off x="5192470" y="1062930"/>
             <a:ext cx="6694009" cy="4964723"/>
           </a:xfrm>
           <a:prstGeom prst="rect">
@@ -4656,7 +4760,7 @@
             </a:pPr>
             <a:r>
               <a:rPr lang="en-US" altLang="ja-JP" sz="2400" dirty="0"/>
-              <a:t>The above are Python’s most basic </a:t>
+              <a:t>The above are Python’s basic </a:t>
             </a:r>
             <a:r>
               <a:rPr lang="en-US" altLang="ja-JP" sz="2400" i="1" dirty="0"/>
@@ -5335,18 +5439,20 @@
         <p:spPr>
           <a:xfrm>
             <a:off x="480646" y="468923"/>
-            <a:ext cx="10515600" cy="957996"/>
+            <a:ext cx="10515600" cy="800584"/>
           </a:xfrm>
         </p:spPr>
         <p:txBody>
-          <a:bodyPr/>
+          <a:bodyPr>
+            <a:normAutofit/>
+          </a:bodyPr>
           <a:lstStyle/>
           <a:p>
             <a:r>
-              <a:rPr lang="en-US" dirty="0"/>
+              <a:rPr lang="en-US" sz="3800" dirty="0"/>
               <a:t>Fundamental concepts</a:t>
             </a:r>
-            <a:endParaRPr lang="de-CH" dirty="0"/>
+            <a:endParaRPr lang="de-CH" sz="3800" dirty="0"/>
           </a:p>
         </p:txBody>
       </p:sp>
@@ -5362,28 +5468,61 @@
         </p:nvSpPr>
         <p:spPr>
           <a:xfrm>
-            <a:off x="674077" y="1737702"/>
-            <a:ext cx="10515600" cy="3889375"/>
+            <a:off x="674077" y="1597982"/>
+            <a:ext cx="10866894" cy="4705164"/>
           </a:xfrm>
         </p:spPr>
         <p:txBody>
           <a:bodyPr>
-            <a:normAutofit fontScale="92500" lnSpcReduction="10000"/>
+            <a:noAutofit/>
           </a:bodyPr>
           <a:lstStyle/>
           <a:p>
             <a:r>
-              <a:rPr lang="en-US" sz="2400" dirty="0"/>
-              <a:t>In Python, everything is an object.</a:t>
-            </a:r>
-          </a:p>
-          <a:p>
-            <a:r>
-              <a:rPr lang="en-US" sz="2400" dirty="0"/>
-              <a:t>Use type() to return the type of any object. You will notice that even the basic data types are classes, for example: </a:t>
-            </a:r>
-            <a:r>
-              <a:rPr lang="en-US" sz="2400" dirty="0">
+              <a:rPr lang="en-US" sz="2200" dirty="0"/>
+              <a:t>In Python, everything is an </a:t>
+            </a:r>
+            <a:r>
+              <a:rPr lang="en-US" sz="2200" i="1" dirty="0"/>
+              <a:t>object</a:t>
+            </a:r>
+            <a:r>
+              <a:rPr lang="en-US" sz="2200" dirty="0"/>
+              <a:t>!</a:t>
+            </a:r>
+          </a:p>
+          <a:p>
+            <a:r>
+              <a:rPr lang="en-US" sz="2200" dirty="0"/>
+              <a:t>Use </a:t>
+            </a:r>
+            <a:r>
+              <a:rPr lang="en-US" sz="2200" dirty="0">
+                <a:effectLst>
+                  <a:outerShdw blurRad="38100" dist="38100" dir="2700000" algn="tl">
+                    <a:srgbClr val="000000">
+                      <a:alpha val="43137"/>
+                    </a:srgbClr>
+                  </a:outerShdw>
+                </a:effectLst>
+                <a:latin typeface="Consolas" panose="020B0609020204030204" pitchFamily="49" charset="0"/>
+              </a:rPr>
+              <a:t>type()</a:t>
+            </a:r>
+            <a:r>
+              <a:rPr lang="en-US" sz="2200" dirty="0"/>
+              <a:t> to return the type of any object. You will notice that even the basic data types are </a:t>
+            </a:r>
+            <a:r>
+              <a:rPr lang="en-US" sz="2200" i="1" dirty="0"/>
+              <a:t>classes</a:t>
+            </a:r>
+            <a:r>
+              <a:rPr lang="en-US" sz="2200" dirty="0"/>
+              <a:t>, for example: </a:t>
+            </a:r>
+            <a:r>
+              <a:rPr lang="en-US" sz="2200" dirty="0">
                 <a:effectLst>
                   <a:outerShdw blurRad="38100" dist="38100" dir="2700000" algn="tl">
                     <a:srgbClr val="000000">
@@ -5397,25 +5536,25 @@
               <a:t>&lt;class: 'int'&gt; </a:t>
             </a:r>
             <a:r>
-              <a:rPr lang="en-US" sz="2400" dirty="0">
+              <a:rPr lang="en-US" sz="2200" dirty="0">
                 <a:cs typeface="Consolas" panose="020B0609020204030204" pitchFamily="49" charset="0"/>
               </a:rPr>
               <a:t>(in </a:t>
             </a:r>
             <a:r>
-              <a:rPr lang="en-US" sz="2400" dirty="0" err="1">
+              <a:rPr lang="en-US" sz="2200" dirty="0" err="1">
                 <a:cs typeface="Consolas" panose="020B0609020204030204" pitchFamily="49" charset="0"/>
               </a:rPr>
               <a:t>Jupyter</a:t>
             </a:r>
             <a:r>
-              <a:rPr lang="en-US" sz="2400" dirty="0">
+              <a:rPr lang="en-US" sz="2200" dirty="0">
                 <a:cs typeface="Consolas" panose="020B0609020204030204" pitchFamily="49" charset="0"/>
               </a:rPr>
               <a:t> Notebook, only</a:t>
             </a:r>
             <a:r>
-              <a:rPr lang="en-US" sz="2400" dirty="0">
+              <a:rPr lang="en-US" sz="2200" dirty="0">
                 <a:effectLst>
                   <a:outerShdw blurRad="38100" dist="38100" dir="2700000" algn="tl">
                     <a:srgbClr val="000000">
@@ -5429,61 +5568,87 @@
               <a:t> int </a:t>
             </a:r>
             <a:r>
-              <a:rPr lang="en-US" sz="2400" dirty="0">
+              <a:rPr lang="en-US" sz="2200" dirty="0">
                 <a:cs typeface="Consolas" panose="020B0609020204030204" pitchFamily="49" charset="0"/>
               </a:rPr>
               <a:t>is shown)</a:t>
             </a:r>
-            <a:endParaRPr lang="en-US" sz="2400" dirty="0">
+            <a:endParaRPr lang="en-US" sz="2200" dirty="0">
               <a:latin typeface="Consolas" panose="020B0609020204030204" pitchFamily="49" charset="0"/>
               <a:cs typeface="Consolas" panose="020B0609020204030204" pitchFamily="49" charset="0"/>
             </a:endParaRPr>
           </a:p>
           <a:p>
             <a:r>
-              <a:rPr lang="en-US" sz="2400" dirty="0"/>
-              <a:t>Use id() to return the ‘identity’ of an object, which is its location in memory (for </a:t>
-            </a:r>
-            <a:r>
-              <a:rPr lang="en-US" sz="2400" dirty="0" err="1"/>
+              <a:rPr lang="en-US" sz="2200" dirty="0"/>
+              <a:t>Use </a:t>
+            </a:r>
+            <a:r>
+              <a:rPr lang="en-US" sz="2200" dirty="0">
+                <a:effectLst>
+                  <a:outerShdw blurRad="38100" dist="38100" dir="2700000" algn="tl">
+                    <a:srgbClr val="000000">
+                      <a:alpha val="43137"/>
+                    </a:srgbClr>
+                  </a:outerShdw>
+                </a:effectLst>
+                <a:latin typeface="Consolas" panose="020B0609020204030204" pitchFamily="49" charset="0"/>
+              </a:rPr>
+              <a:t>id()</a:t>
+            </a:r>
+            <a:r>
+              <a:rPr lang="en-US" sz="2200" dirty="0"/>
+              <a:t> to return the ‘identity’ of an object, which is its location in memory (for </a:t>
+            </a:r>
+            <a:r>
+              <a:rPr lang="en-US" sz="2200" dirty="0" err="1"/>
               <a:t>CPython</a:t>
             </a:r>
             <a:r>
-              <a:rPr lang="en-US" sz="2400" dirty="0"/>
+              <a:rPr lang="en-US" sz="2200" dirty="0"/>
               <a:t>). It’s unique and constant during an object’s lifetime.</a:t>
             </a:r>
           </a:p>
           <a:p>
             <a:r>
-              <a:rPr lang="en-US" sz="2400" b="1" dirty="0"/>
+              <a:rPr lang="en-US" sz="2200" b="1" dirty="0"/>
               <a:t>Mutable objects </a:t>
             </a:r>
             <a:r>
-              <a:rPr lang="en-US" sz="2400" dirty="0"/>
+              <a:rPr lang="en-US" sz="2200" dirty="0"/>
               <a:t>can be changed (= modified in place) and will remain pointed to a fixed location in memory. </a:t>
             </a:r>
           </a:p>
           <a:p>
             <a:r>
-              <a:rPr lang="en-US" sz="2400" b="1" dirty="0"/>
+              <a:rPr lang="en-US" sz="2200" b="1" dirty="0"/>
               <a:t>Immutable objects</a:t>
             </a:r>
             <a:r>
-              <a:rPr lang="en-US" sz="2400" dirty="0"/>
+              <a:rPr lang="en-US" sz="2200" dirty="0"/>
               <a:t> cannot be changed, only reassigned to new values. If reassigned, they point to a new location in memory.</a:t>
             </a:r>
           </a:p>
           <a:p>
-            <a:r>
-              <a:rPr lang="en-US" sz="2400" dirty="0"/>
+            <a:pPr marL="0" indent="0">
+              <a:buNone/>
+            </a:pPr>
+            <a:endParaRPr lang="en-US" sz="2200" dirty="0"/>
+          </a:p>
+          <a:p>
+            <a:pPr marL="0" indent="0">
+              <a:buNone/>
+            </a:pPr>
+            <a:r>
+              <a:rPr lang="en-US" sz="2200" dirty="0"/>
               <a:t>Let’s look at concrete examples in our </a:t>
             </a:r>
             <a:r>
-              <a:rPr lang="en-US" sz="2400" dirty="0" err="1"/>
+              <a:rPr lang="en-US" sz="2200" dirty="0" err="1"/>
               <a:t>Jupyter</a:t>
             </a:r>
             <a:r>
-              <a:rPr lang="en-US" sz="2400" dirty="0"/>
+              <a:rPr lang="en-US" sz="2200" dirty="0"/>
               <a:t> Notebook!</a:t>
             </a:r>
           </a:p>
@@ -5492,7 +5657,7 @@
               <a:buNone/>
             </a:pPr>
             <a:r>
-              <a:rPr lang="en-US" sz="2400" dirty="0">
+              <a:rPr lang="en-US" sz="2200" dirty="0">
                 <a:latin typeface="Arial Unicode MS" panose="020B0604020202020204" pitchFamily="34" charset="-128"/>
                 <a:ea typeface="Arial Unicode MS" panose="020B0604020202020204" pitchFamily="34" charset="-128"/>
                 <a:cs typeface="Arial Unicode MS" panose="020B0604020202020204" pitchFamily="34" charset="-128"/>
@@ -5500,13 +5665,13 @@
               <a:t>→ </a:t>
             </a:r>
             <a:r>
-              <a:rPr lang="en-US" sz="2400" dirty="0" err="1">
+              <a:rPr lang="en-US" sz="2200" dirty="0" err="1">
                 <a:ea typeface="Arial Unicode MS" panose="020B0604020202020204" pitchFamily="34" charset="-128"/>
                 <a:cs typeface="Arial Unicode MS" panose="020B0604020202020204" pitchFamily="34" charset="-128"/>
               </a:rPr>
               <a:t>datatypes.ipynb</a:t>
             </a:r>
-            <a:endParaRPr lang="de-CH" sz="2400" dirty="0"/>
+            <a:endParaRPr lang="de-CH" sz="2200" dirty="0"/>
           </a:p>
         </p:txBody>
       </p:sp>
@@ -5752,7 +5917,7 @@
                                         <p:tgtEl>
                                           <p:spTgt spid="3">
                                             <p:txEl>
-                                              <p:pRg st="5" end="5"/>
+                                              <p:pRg st="6" end="6"/>
                                             </p:txEl>
                                           </p:spTgt>
                                         </p:tgtEl>
@@ -5783,7 +5948,7 @@
                                         <p:tgtEl>
                                           <p:spTgt spid="3">
                                             <p:txEl>
-                                              <p:pRg st="6" end="6"/>
+                                              <p:pRg st="7" end="7"/>
                                             </p:txEl>
                                           </p:spTgt>
                                         </p:tgtEl>
@@ -5858,19 +6023,21 @@
         </p:nvSpPr>
         <p:spPr>
           <a:xfrm>
-            <a:off x="480647" y="334108"/>
-            <a:ext cx="10515600" cy="864211"/>
+            <a:off x="356360" y="277345"/>
+            <a:ext cx="10515600" cy="699032"/>
           </a:xfrm>
         </p:spPr>
         <p:txBody>
-          <a:bodyPr/>
+          <a:bodyPr>
+            <a:normAutofit/>
+          </a:bodyPr>
           <a:lstStyle/>
           <a:p>
             <a:r>
-              <a:rPr lang="en-US" dirty="0"/>
+              <a:rPr lang="en-US" sz="3500" dirty="0"/>
               <a:t>Passing by reference vs passing by value</a:t>
             </a:r>
-            <a:endParaRPr lang="de-CH" dirty="0"/>
+            <a:endParaRPr lang="de-CH" sz="3500" dirty="0"/>
           </a:p>
         </p:txBody>
       </p:sp>
@@ -5886,8 +6053,8 @@
         </p:nvSpPr>
         <p:spPr>
           <a:xfrm>
-            <a:off x="609600" y="1327394"/>
-            <a:ext cx="10781414" cy="2254006"/>
+            <a:off x="609599" y="1254667"/>
+            <a:ext cx="10824839" cy="2254006"/>
           </a:xfrm>
         </p:spPr>
         <p:txBody>
@@ -5920,13 +6087,29 @@
           <a:p>
             <a:r>
               <a:rPr lang="en-US" sz="2000" dirty="0"/>
-              <a:t>Passing a mutable object, for example a dictionary: You are passing a reference to the object. If you change it inside the function, the object will also be changed outside the function.</a:t>
-            </a:r>
-          </a:p>
-          <a:p>
+              <a:t>Passing a mutable object, for example a dictionary, means that you are passing a </a:t>
+            </a:r>
+            <a:r>
+              <a:rPr lang="en-US" sz="2000" b="1" i="1" dirty="0"/>
+              <a:t>reference</a:t>
+            </a:r>
             <a:r>
               <a:rPr lang="en-US" sz="2000" dirty="0"/>
-              <a:t>If you pass an immutable object, for example a string: In this case, the function can only use the value of this string. If the object is changed inside the function, it has no effect on the outside scope.</a:t>
+              <a:t> to the object. If you change it inside the function, the object will also be changed outside the function!</a:t>
+            </a:r>
+          </a:p>
+          <a:p>
+            <a:r>
+              <a:rPr lang="en-US" sz="2000" dirty="0"/>
+              <a:t>If you pass an immutable object, for example a string: In this case, the function can only use the </a:t>
+            </a:r>
+            <a:r>
+              <a:rPr lang="en-US" sz="2000" b="1" i="1" dirty="0"/>
+              <a:t>value</a:t>
+            </a:r>
+            <a:r>
+              <a:rPr lang="en-US" sz="2000" dirty="0"/>
+              <a:t> of this string. If the object is changed inside the function, it has no effect on the outside scope.</a:t>
             </a:r>
             <a:endParaRPr lang="de-CH" dirty="0"/>
           </a:p>
@@ -6263,35 +6446,6 @@
           <a:chExt cx="0" cy="0"/>
         </a:xfrm>
       </p:grpSpPr>
-      <p:pic>
-        <p:nvPicPr>
-          <p:cNvPr id="6" name="Content Placeholder 5"/>
-          <p:cNvPicPr>
-            <a:picLocks noGrp="1" noChangeAspect="1"/>
-          </p:cNvPicPr>
-          <p:nvPr>
-            <p:ph idx="1"/>
-          </p:nvPr>
-        </p:nvPicPr>
-        <p:blipFill>
-          <a:blip r:embed="rId2" cstate="print">
-            <a:extLst>
-              <a:ext uri="{28A0092B-C50C-407E-A947-70E740481C1C}">
-                <a14:useLocalDpi xmlns:a14="http://schemas.microsoft.com/office/drawing/2010/main" val="0"/>
-              </a:ext>
-            </a:extLst>
-          </a:blip>
-          <a:stretch>
-            <a:fillRect/>
-          </a:stretch>
-        </p:blipFill>
-        <p:spPr>
-          <a:xfrm>
-            <a:off x="1096114" y="855541"/>
-            <a:ext cx="2538047" cy="1001100"/>
-          </a:xfrm>
-        </p:spPr>
-      </p:pic>
       <p:sp>
         <p:nvSpPr>
           <p:cNvPr id="8" name="TextBox 7"/>
@@ -6300,8 +6454,8 @@
         </p:nvSpPr>
         <p:spPr>
           <a:xfrm>
-            <a:off x="1096114" y="2031589"/>
-            <a:ext cx="3839307" cy="1384995"/>
+            <a:off x="918554" y="2013833"/>
+            <a:ext cx="4496818" cy="1692771"/>
           </a:xfrm>
           <a:prstGeom prst="rect">
             <a:avLst/>
@@ -6315,53 +6469,65 @@
           <a:lstStyle/>
           <a:p>
             <a:r>
-              <a:rPr lang="en-US" sz="1400" dirty="0"/>
+              <a:rPr lang="en-US" sz="1600" dirty="0"/>
               <a:t>(pronounced </a:t>
             </a:r>
             <a:r>
-              <a:rPr lang="en-US" sz="1400" i="1" dirty="0" err="1"/>
+              <a:rPr lang="en-US" sz="1600" i="1" dirty="0" err="1"/>
               <a:t>Num</a:t>
             </a:r>
             <a:r>
-              <a:rPr lang="en-US" sz="1400" i="1" dirty="0"/>
+              <a:rPr lang="en-US" sz="1600" i="1" dirty="0"/>
               <a:t> Pie</a:t>
             </a:r>
             <a:r>
-              <a:rPr lang="en-US" sz="1400" dirty="0"/>
+              <a:rPr lang="en-US" sz="1600" dirty="0"/>
               <a:t>) </a:t>
             </a:r>
           </a:p>
           <a:p>
-            <a:r>
-              <a:rPr lang="en-US" sz="1400" dirty="0"/>
+            <a:pPr>
+              <a:spcAft>
+                <a:spcPts val="800"/>
+              </a:spcAft>
+            </a:pPr>
+            <a:r>
+              <a:rPr lang="en-US" sz="1600" dirty="0"/>
               <a:t>A library for fast manipulation of multidimensional numerical data. The basic type </a:t>
             </a:r>
             <a:r>
-              <a:rPr lang="en-US" sz="1400" i="1" dirty="0" err="1"/>
+              <a:rPr lang="en-US" sz="1600" i="1" dirty="0" err="1"/>
               <a:t>ndarray</a:t>
             </a:r>
             <a:r>
-              <a:rPr lang="en-US" sz="1400" dirty="0"/>
-              <a:t> is a multidimensional array with zero-based indexing</a:t>
-            </a:r>
-          </a:p>
-          <a:p>
-            <a:r>
-              <a:rPr lang="en-US" sz="1400" dirty="0">
+              <a:rPr lang="en-US" sz="1600" dirty="0"/>
+              <a:t> is a multidimensional array with zero-based indexing.</a:t>
+            </a:r>
+          </a:p>
+          <a:p>
+            <a:r>
+              <a:rPr lang="en-US" sz="1600" dirty="0">
                 <a:latin typeface="Arial Unicode MS" panose="020B0604020202020204" pitchFamily="34" charset="-128"/>
                 <a:ea typeface="Arial Unicode MS" panose="020B0604020202020204" pitchFamily="34" charset="-128"/>
                 <a:cs typeface="Arial Unicode MS" panose="020B0604020202020204" pitchFamily="34" charset="-128"/>
               </a:rPr>
-              <a:t>	→ </a:t>
-            </a:r>
-            <a:r>
-              <a:rPr lang="en-US" sz="1400" dirty="0" err="1">
+              <a:t>	→</a:t>
+            </a:r>
+            <a:r>
+              <a:rPr lang="en-US" sz="1600" dirty="0">
+                <a:ea typeface="Arial Unicode MS" panose="020B0604020202020204" pitchFamily="34" charset="-128"/>
+                <a:cs typeface="Arial Unicode MS" panose="020B0604020202020204" pitchFamily="34" charset="-128"/>
+              </a:rPr>
+              <a:t> </a:t>
+            </a:r>
+            <a:r>
+              <a:rPr lang="en-US" sz="1600" dirty="0" err="1">
                 <a:ea typeface="Arial Unicode MS" panose="020B0604020202020204" pitchFamily="34" charset="-128"/>
                 <a:cs typeface="Arial Unicode MS" panose="020B0604020202020204" pitchFamily="34" charset="-128"/>
               </a:rPr>
               <a:t>numpy-intro.ipynb</a:t>
             </a:r>
-            <a:endParaRPr lang="de-CH" sz="1400" dirty="0"/>
+            <a:endParaRPr lang="de-CH" sz="1600" dirty="0"/>
           </a:p>
           <a:p>
             <a:endParaRPr lang="en-US" sz="1400" dirty="0"/>
@@ -6390,8 +6556,8 @@
         </p:blipFill>
         <p:spPr>
           <a:xfrm>
-            <a:off x="5961194" y="976311"/>
-            <a:ext cx="2215662" cy="880330"/>
+            <a:off x="6096000" y="980471"/>
+            <a:ext cx="2277204" cy="904782"/>
           </a:xfrm>
           <a:prstGeom prst="rect">
             <a:avLst/>
@@ -6406,7 +6572,7 @@
         </p:nvSpPr>
         <p:spPr>
           <a:xfrm>
-            <a:off x="211014" y="93786"/>
+            <a:off x="255402" y="170302"/>
             <a:ext cx="7772400" cy="492443"/>
           </a:xfrm>
           <a:prstGeom prst="rect">
@@ -6436,8 +6602,8 @@
         </p:nvSpPr>
         <p:spPr>
           <a:xfrm>
-            <a:off x="5961194" y="2031589"/>
-            <a:ext cx="4888523" cy="1600438"/>
+            <a:off x="6011500" y="2013833"/>
+            <a:ext cx="4748235" cy="1887696"/>
           </a:xfrm>
           <a:prstGeom prst="rect">
             <a:avLst/>
@@ -6451,55 +6617,60 @@
           <a:lstStyle/>
           <a:p>
             <a:r>
-              <a:rPr lang="en-US" sz="1400" dirty="0"/>
+              <a:rPr lang="en-US" sz="1600" dirty="0"/>
               <a:t>(pronounced </a:t>
             </a:r>
             <a:r>
-              <a:rPr lang="en-US" sz="1400" i="1" dirty="0"/>
+              <a:rPr lang="en-US" sz="1600" i="1" dirty="0"/>
               <a:t>Sigh Pie</a:t>
             </a:r>
             <a:r>
-              <a:rPr lang="en-US" sz="1400" dirty="0"/>
+              <a:rPr lang="en-US" sz="1600" dirty="0"/>
               <a:t>) </a:t>
             </a:r>
           </a:p>
           <a:p>
             <a:r>
-              <a:rPr lang="en-US" sz="1400" dirty="0"/>
-              <a:t>A scientific computing library with various modules for numerical integration, linear algebra, image processing, Fourier transforms, signal processing, statistical functions…</a:t>
-            </a:r>
-          </a:p>
-          <a:p>
-            <a:r>
-              <a:rPr lang="en-US" sz="1400" dirty="0"/>
-              <a:t>Builds upon </a:t>
-            </a:r>
-            <a:r>
-              <a:rPr lang="en-US" sz="1400" dirty="0" err="1"/>
-              <a:t>numpy</a:t>
-            </a:r>
-            <a:r>
-              <a:rPr lang="en-US" sz="1400" dirty="0"/>
-              <a:t> arrays.</a:t>
-            </a:r>
-          </a:p>
-          <a:p>
-            <a:r>
-              <a:rPr lang="en-US" sz="1400" dirty="0">
+              <a:rPr lang="en-US" sz="1600" dirty="0"/>
+              <a:t>A scientific computing library (built with NumPy arrays) with various modules for numerical integration, linear algebra, image processing, Fourier transforms, signal processing, statistical functions… </a:t>
+            </a:r>
+          </a:p>
+          <a:p>
+            <a:pPr>
+              <a:spcBef>
+                <a:spcPts val="800"/>
+              </a:spcBef>
+            </a:pPr>
+            <a:r>
+              <a:rPr lang="en-US" sz="1600" dirty="0">
+                <a:ea typeface="Arial Unicode MS" panose="020B0604020202020204" pitchFamily="34" charset="-128"/>
+                <a:cs typeface="Arial Unicode MS" panose="020B0604020202020204" pitchFamily="34" charset="-128"/>
+              </a:rPr>
+              <a:t> 	</a:t>
+            </a:r>
+            <a:r>
+              <a:rPr lang="en-US" sz="1600" dirty="0">
                 <a:latin typeface="Arial Unicode MS" panose="020B0604020202020204" pitchFamily="34" charset="-128"/>
                 <a:ea typeface="Arial Unicode MS" panose="020B0604020202020204" pitchFamily="34" charset="-128"/>
                 <a:cs typeface="Arial Unicode MS" panose="020B0604020202020204" pitchFamily="34" charset="-128"/>
               </a:rPr>
-              <a:t>	→ </a:t>
-            </a:r>
-            <a:r>
-              <a:rPr lang="en-US" sz="1400" dirty="0" err="1">
+              <a:t>→</a:t>
+            </a:r>
+            <a:r>
+              <a:rPr lang="en-US" sz="1600" dirty="0">
+                <a:ea typeface="Arial Unicode MS" panose="020B0604020202020204" pitchFamily="34" charset="-128"/>
+                <a:cs typeface="Arial Unicode MS" panose="020B0604020202020204" pitchFamily="34" charset="-128"/>
+              </a:rPr>
+              <a:t> </a:t>
+            </a:r>
+            <a:r>
+              <a:rPr lang="en-US" sz="1600" dirty="0" err="1">
                 <a:ea typeface="Arial Unicode MS" panose="020B0604020202020204" pitchFamily="34" charset="-128"/>
                 <a:cs typeface="Arial Unicode MS" panose="020B0604020202020204" pitchFamily="34" charset="-128"/>
               </a:rPr>
               <a:t>scipy-intro.ipynb</a:t>
             </a:r>
-            <a:endParaRPr lang="en-US" sz="1400" dirty="0"/>
+            <a:endParaRPr lang="en-US" sz="1600" dirty="0"/>
           </a:p>
           <a:p>
             <a:r>
@@ -6510,9 +6681,118 @@
           </a:p>
         </p:txBody>
       </p:sp>
+      <p:sp>
+        <p:nvSpPr>
+          <p:cNvPr id="13" name="TextBox 12"/>
+          <p:cNvSpPr txBox="1"/>
+          <p:nvPr/>
+        </p:nvSpPr>
+        <p:spPr>
+          <a:xfrm>
+            <a:off x="918553" y="4841763"/>
+            <a:ext cx="4621113" cy="1672253"/>
+          </a:xfrm>
+          <a:prstGeom prst="rect">
+            <a:avLst/>
+          </a:prstGeom>
+          <a:noFill/>
+        </p:spPr>
+        <p:txBody>
+          <a:bodyPr wrap="square" rtlCol="0">
+            <a:spAutoFit/>
+          </a:bodyPr>
+          <a:lstStyle/>
+          <a:p>
+            <a:r>
+              <a:rPr lang="en-US" sz="1600" dirty="0"/>
+              <a:t>pandas – </a:t>
+            </a:r>
+            <a:r>
+              <a:rPr lang="en-US" sz="1600" b="1" dirty="0"/>
+              <a:t>pan</a:t>
+            </a:r>
+            <a:r>
+              <a:rPr lang="en-US" sz="1600" dirty="0"/>
+              <a:t>el </a:t>
+            </a:r>
+            <a:r>
+              <a:rPr lang="en-US" sz="1600" b="1" dirty="0"/>
+              <a:t>da</a:t>
+            </a:r>
+            <a:r>
+              <a:rPr lang="en-US" sz="1600" dirty="0"/>
+              <a:t>ta </a:t>
+            </a:r>
+            <a:r>
+              <a:rPr lang="en-US" sz="1600" b="1" dirty="0"/>
+              <a:t>s</a:t>
+            </a:r>
+            <a:r>
+              <a:rPr lang="en-US" sz="1600" dirty="0"/>
+              <a:t>tructures</a:t>
+            </a:r>
+          </a:p>
+          <a:p>
+            <a:r>
+              <a:rPr lang="en-US" sz="1600" dirty="0"/>
+              <a:t>Various tools to work with structured data sets (similar to SQL/Excel functionality). Useful for handling tables, for example measurement results. The basic types are </a:t>
+            </a:r>
+            <a:r>
+              <a:rPr lang="en-US" sz="1600" i="1" dirty="0" err="1"/>
+              <a:t>DataFrame</a:t>
+            </a:r>
+            <a:r>
+              <a:rPr lang="en-US" sz="1600" dirty="0"/>
+              <a:t> and </a:t>
+            </a:r>
+            <a:r>
+              <a:rPr lang="en-US" sz="1600" i="1" dirty="0"/>
+              <a:t>Series</a:t>
+            </a:r>
+            <a:r>
+              <a:rPr lang="en-US" sz="1600" dirty="0"/>
+              <a:t>.</a:t>
+            </a:r>
+          </a:p>
+          <a:p>
+            <a:pPr>
+              <a:spcBef>
+                <a:spcPts val="800"/>
+              </a:spcBef>
+            </a:pPr>
+            <a:r>
+              <a:rPr lang="en-US" sz="1600" dirty="0"/>
+              <a:t>	</a:t>
+            </a:r>
+            <a:r>
+              <a:rPr lang="en-US" sz="1600" dirty="0">
+                <a:latin typeface="Arial Unicode MS" panose="020B0604020202020204" pitchFamily="34" charset="-128"/>
+                <a:ea typeface="Arial Unicode MS" panose="020B0604020202020204" pitchFamily="34" charset="-128"/>
+                <a:cs typeface="Arial Unicode MS" panose="020B0604020202020204" pitchFamily="34" charset="-128"/>
+              </a:rPr>
+              <a:t>→ </a:t>
+            </a:r>
+            <a:r>
+              <a:rPr lang="en-US" sz="1600" dirty="0">
+                <a:ea typeface="Arial Unicode MS" panose="020B0604020202020204" pitchFamily="34" charset="-128"/>
+                <a:cs typeface="Arial Unicode MS" panose="020B0604020202020204" pitchFamily="34" charset="-128"/>
+              </a:rPr>
+              <a:t>pandas-</a:t>
+            </a:r>
+            <a:r>
+              <a:rPr lang="en-US" sz="1600" dirty="0" err="1">
+                <a:ea typeface="Arial Unicode MS" panose="020B0604020202020204" pitchFamily="34" charset="-128"/>
+                <a:cs typeface="Arial Unicode MS" panose="020B0604020202020204" pitchFamily="34" charset="-128"/>
+              </a:rPr>
+              <a:t>intro.ipynb</a:t>
+            </a:r>
+            <a:endParaRPr lang="en-US" sz="1600" dirty="0"/>
+          </a:p>
+        </p:txBody>
+      </p:sp>
       <p:pic>
         <p:nvPicPr>
-          <p:cNvPr id="12" name="Picture 11"/>
+          <p:cNvPr id="14" name="Picture 13"/>
           <p:cNvPicPr>
             <a:picLocks noChangeAspect="1"/>
           </p:cNvPicPr>
@@ -6532,133 +6812,7 @@
         </p:blipFill>
         <p:spPr>
           <a:xfrm>
-            <a:off x="1096114" y="3875515"/>
-            <a:ext cx="3903786" cy="811540"/>
-          </a:xfrm>
-          <a:prstGeom prst="rect">
-            <a:avLst/>
-          </a:prstGeom>
-        </p:spPr>
-      </p:pic>
-      <p:sp>
-        <p:nvSpPr>
-          <p:cNvPr id="13" name="TextBox 12"/>
-          <p:cNvSpPr txBox="1"/>
-          <p:nvPr/>
-        </p:nvSpPr>
-        <p:spPr>
-          <a:xfrm>
-            <a:off x="1096113" y="4930543"/>
-            <a:ext cx="3839307" cy="1384995"/>
-          </a:xfrm>
-          <a:prstGeom prst="rect">
-            <a:avLst/>
-          </a:prstGeom>
-          <a:noFill/>
-        </p:spPr>
-        <p:txBody>
-          <a:bodyPr wrap="square" rtlCol="0">
-            <a:spAutoFit/>
-          </a:bodyPr>
-          <a:lstStyle/>
-          <a:p>
-            <a:r>
-              <a:rPr lang="en-US" sz="1400" dirty="0"/>
-              <a:t>pandas – </a:t>
-            </a:r>
-            <a:r>
-              <a:rPr lang="en-US" sz="1400" b="1" dirty="0"/>
-              <a:t>pan</a:t>
-            </a:r>
-            <a:r>
-              <a:rPr lang="en-US" sz="1400" dirty="0"/>
-              <a:t>el </a:t>
-            </a:r>
-            <a:r>
-              <a:rPr lang="en-US" sz="1400" b="1" dirty="0"/>
-              <a:t>da</a:t>
-            </a:r>
-            <a:r>
-              <a:rPr lang="en-US" sz="1400" dirty="0"/>
-              <a:t>ta </a:t>
-            </a:r>
-            <a:r>
-              <a:rPr lang="en-US" sz="1400" b="1" dirty="0"/>
-              <a:t>s</a:t>
-            </a:r>
-            <a:r>
-              <a:rPr lang="en-US" sz="1400" dirty="0"/>
-              <a:t>tructures</a:t>
-            </a:r>
-          </a:p>
-          <a:p>
-            <a:r>
-              <a:rPr lang="en-US" sz="1400" dirty="0"/>
-              <a:t>Various tools to work with structured data sets (SQL/Excel functionality). Useful for loading and manipulating tables, for example measurement results. The basic types are </a:t>
-            </a:r>
-            <a:r>
-              <a:rPr lang="en-US" sz="1400" dirty="0" err="1"/>
-              <a:t>DataFrame</a:t>
-            </a:r>
-            <a:r>
-              <a:rPr lang="en-US" sz="1400" dirty="0"/>
-              <a:t> and Series.</a:t>
-            </a:r>
-          </a:p>
-          <a:p>
-            <a:r>
-              <a:rPr lang="en-US" sz="1400" dirty="0"/>
-              <a:t>	</a:t>
-            </a:r>
-            <a:r>
-              <a:rPr lang="en-US" sz="1400" dirty="0">
-                <a:latin typeface="Arial Unicode MS" panose="020B0604020202020204" pitchFamily="34" charset="-128"/>
-                <a:ea typeface="Arial Unicode MS" panose="020B0604020202020204" pitchFamily="34" charset="-128"/>
-                <a:cs typeface="Arial Unicode MS" panose="020B0604020202020204" pitchFamily="34" charset="-128"/>
-              </a:rPr>
-              <a:t> → </a:t>
-            </a:r>
-            <a:r>
-              <a:rPr lang="en-US" sz="1400" dirty="0">
-                <a:ea typeface="Arial Unicode MS" panose="020B0604020202020204" pitchFamily="34" charset="-128"/>
-                <a:cs typeface="Arial Unicode MS" panose="020B0604020202020204" pitchFamily="34" charset="-128"/>
-              </a:rPr>
-              <a:t>pandas-</a:t>
-            </a:r>
-            <a:r>
-              <a:rPr lang="en-US" sz="1400" dirty="0" err="1">
-                <a:ea typeface="Arial Unicode MS" panose="020B0604020202020204" pitchFamily="34" charset="-128"/>
-                <a:cs typeface="Arial Unicode MS" panose="020B0604020202020204" pitchFamily="34" charset="-128"/>
-              </a:rPr>
-              <a:t>intro.ipynb</a:t>
-            </a:r>
-            <a:endParaRPr lang="en-US" sz="1400" dirty="0"/>
-          </a:p>
-        </p:txBody>
-      </p:sp>
-      <p:pic>
-        <p:nvPicPr>
-          <p:cNvPr id="14" name="Picture 13"/>
-          <p:cNvPicPr>
-            <a:picLocks noChangeAspect="1"/>
-          </p:cNvPicPr>
-          <p:nvPr/>
-        </p:nvPicPr>
-        <p:blipFill>
-          <a:blip r:embed="rId5">
-            <a:extLst>
-              <a:ext uri="{28A0092B-C50C-407E-A947-70E740481C1C}">
-                <a14:useLocalDpi xmlns:a14="http://schemas.microsoft.com/office/drawing/2010/main" val="0"/>
-              </a:ext>
-            </a:extLst>
-          </a:blip>
-          <a:stretch>
-            <a:fillRect/>
-          </a:stretch>
-        </p:blipFill>
-        <p:spPr>
-          <a:xfrm>
-            <a:off x="5961194" y="3958859"/>
+            <a:off x="6069366" y="3951757"/>
             <a:ext cx="2807677" cy="644852"/>
           </a:xfrm>
           <a:prstGeom prst="rect">
@@ -6674,8 +6828,8 @@
         </p:nvSpPr>
         <p:spPr>
           <a:xfrm>
-            <a:off x="5961194" y="4930543"/>
-            <a:ext cx="3839307" cy="1169551"/>
+            <a:off x="6011501" y="4841763"/>
+            <a:ext cx="4558845" cy="1395254"/>
           </a:xfrm>
           <a:prstGeom prst="rect">
             <a:avLst/>
@@ -6689,61 +6843,199 @@
           <a:lstStyle/>
           <a:p>
             <a:r>
-              <a:rPr lang="en-US" sz="1400" dirty="0"/>
+              <a:rPr lang="en-US" sz="1600" dirty="0"/>
               <a:t>MATLAB-like visualization support through the </a:t>
             </a:r>
             <a:r>
-              <a:rPr lang="en-US" sz="1400" dirty="0" err="1"/>
+              <a:rPr lang="en-US" sz="1600" dirty="0" err="1"/>
               <a:t>pyplot</a:t>
             </a:r>
             <a:r>
-              <a:rPr lang="en-US" sz="1400" dirty="0"/>
+              <a:rPr lang="en-US" sz="1600" dirty="0"/>
               <a:t> module: 2D and 3D plots, histograms, </a:t>
             </a:r>
             <a:r>
-              <a:rPr lang="en-US" sz="1400" dirty="0" err="1"/>
+              <a:rPr lang="en-US" sz="1600" dirty="0" err="1"/>
               <a:t>multipanel</a:t>
             </a:r>
             <a:r>
-              <a:rPr lang="en-US" sz="1400" dirty="0"/>
+              <a:rPr lang="en-US" sz="1600" dirty="0"/>
               <a:t> figures; works in </a:t>
             </a:r>
             <a:r>
-              <a:rPr lang="en-US" sz="1400" dirty="0" err="1"/>
+              <a:rPr lang="en-US" sz="1600" dirty="0" err="1"/>
               <a:t>Jupyter</a:t>
             </a:r>
             <a:r>
-              <a:rPr lang="en-US" sz="1400" dirty="0"/>
-              <a:t> notebooks.</a:t>
-            </a:r>
-          </a:p>
-          <a:p>
-            <a:r>
-              <a:rPr lang="en-US" sz="1400" dirty="0"/>
+              <a:rPr lang="en-US" sz="1600" dirty="0"/>
+              <a:t> Notebooks.</a:t>
+            </a:r>
+          </a:p>
+          <a:p>
+            <a:pPr>
+              <a:spcBef>
+                <a:spcPts val="800"/>
+              </a:spcBef>
+            </a:pPr>
+            <a:r>
+              <a:rPr lang="en-US" sz="1600" dirty="0"/>
               <a:t>	</a:t>
             </a:r>
             <a:r>
-              <a:rPr lang="en-US" sz="1400" dirty="0">
+              <a:rPr lang="en-US" sz="1600" dirty="0">
                 <a:latin typeface="Arial Unicode MS" panose="020B0604020202020204" pitchFamily="34" charset="-128"/>
                 <a:ea typeface="Arial Unicode MS" panose="020B0604020202020204" pitchFamily="34" charset="-128"/>
                 <a:cs typeface="Arial Unicode MS" panose="020B0604020202020204" pitchFamily="34" charset="-128"/>
               </a:rPr>
-              <a:t> → </a:t>
-            </a:r>
-            <a:r>
-              <a:rPr lang="en-US" sz="1400" dirty="0" err="1">
+              <a:t>→ </a:t>
+            </a:r>
+            <a:r>
+              <a:rPr lang="en-US" sz="1600" dirty="0">
                 <a:ea typeface="Arial Unicode MS" panose="020B0604020202020204" pitchFamily="34" charset="-128"/>
                 <a:cs typeface="Arial Unicode MS" panose="020B0604020202020204" pitchFamily="34" charset="-128"/>
               </a:rPr>
-              <a:t>matplotlib-intro.ipynb</a:t>
-            </a:r>
+              <a:t>matplotlib-</a:t>
+            </a:r>
+            <a:r>
+              <a:rPr lang="en-US" sz="1600" dirty="0" err="1">
+                <a:ea typeface="Arial Unicode MS" panose="020B0604020202020204" pitchFamily="34" charset="-128"/>
+                <a:cs typeface="Arial Unicode MS" panose="020B0604020202020204" pitchFamily="34" charset="-128"/>
+              </a:rPr>
+              <a:t>intro.ipynb</a:t>
+            </a:r>
+            <a:endParaRPr lang="en-US" sz="1600" dirty="0"/>
+          </a:p>
+          <a:p>
             <a:endParaRPr lang="en-US" sz="1400" dirty="0"/>
           </a:p>
-          <a:p>
-            <a:endParaRPr lang="en-US" sz="1400" dirty="0"/>
-          </a:p>
-        </p:txBody>
-      </p:sp>
+        </p:txBody>
+      </p:sp>
+      <p:graphicFrame>
+        <p:nvGraphicFramePr>
+          <p:cNvPr id="5" name="Object 4">
+            <a:extLst>
+              <a:ext uri="{FF2B5EF4-FFF2-40B4-BE49-F238E27FC236}">
+                <a16:creationId xmlns:a16="http://schemas.microsoft.com/office/drawing/2014/main" id="{1567AE30-6857-4FE2-8A11-B2BB8CCBDEB8}"/>
+              </a:ext>
+            </a:extLst>
+          </p:cNvPr>
+          <p:cNvGraphicFramePr>
+            <a:graphicFrameLocks noChangeAspect="1"/>
+          </p:cNvGraphicFramePr>
+          <p:nvPr>
+            <p:extLst>
+              <p:ext uri="{D42A27DB-BD31-4B8C-83A1-F6EECF244321}">
+                <p14:modId xmlns:p14="http://schemas.microsoft.com/office/powerpoint/2010/main" val="712799550"/>
+              </p:ext>
+            </p:extLst>
+          </p:nvPr>
+        </p:nvGraphicFramePr>
+        <p:xfrm>
+          <a:off x="945186" y="843045"/>
+          <a:ext cx="2739040" cy="1043444"/>
+        </p:xfrm>
+        <a:graphic>
+          <a:graphicData uri="http://schemas.openxmlformats.org/presentationml/2006/ole">
+            <mc:AlternateContent xmlns:mc="http://schemas.openxmlformats.org/markup-compatibility/2006">
+              <mc:Choice xmlns:v="urn:schemas-microsoft-com:vml" Requires="v">
+                <p:oleObj spid="_x0000_s1041" r:id="rId5" imgW="11301480" imgH="4304520" progId="">
+                  <p:embed/>
+                </p:oleObj>
+              </mc:Choice>
+              <mc:Fallback>
+                <p:oleObj r:id="rId5" imgW="11301480" imgH="4304520" progId="">
+                  <p:embed/>
+                  <p:pic>
+                    <p:nvPicPr>
+                      <p:cNvPr id="0" name=""/>
+                      <p:cNvPicPr/>
+                      <p:nvPr/>
+                    </p:nvPicPr>
+                    <p:blipFill>
+                      <a:blip r:embed="rId6"/>
+                      <a:stretch>
+                        <a:fillRect/>
+                      </a:stretch>
+                    </p:blipFill>
+                    <p:spPr>
+                      <a:xfrm>
+                        <a:off x="945186" y="843045"/>
+                        <a:ext cx="2739040" cy="1043444"/>
+                      </a:xfrm>
+                      <a:prstGeom prst="rect">
+                        <a:avLst/>
+                      </a:prstGeom>
+                    </p:spPr>
+                  </p:pic>
+                </p:oleObj>
+              </mc:Fallback>
+            </mc:AlternateContent>
+          </a:graphicData>
+        </a:graphic>
+      </p:graphicFrame>
+      <p:graphicFrame>
+        <p:nvGraphicFramePr>
+          <p:cNvPr id="7" name="Object 6">
+            <a:extLst>
+              <a:ext uri="{FF2B5EF4-FFF2-40B4-BE49-F238E27FC236}">
+                <a16:creationId xmlns:a16="http://schemas.microsoft.com/office/drawing/2014/main" id="{6D91F002-E967-4B3C-B7B7-B2B7F55FA238}"/>
+              </a:ext>
+            </a:extLst>
+          </p:cNvPr>
+          <p:cNvGraphicFramePr>
+            <a:graphicFrameLocks noChangeAspect="1"/>
+          </p:cNvGraphicFramePr>
+          <p:nvPr>
+            <p:extLst>
+              <p:ext uri="{D42A27DB-BD31-4B8C-83A1-F6EECF244321}">
+                <p14:modId xmlns:p14="http://schemas.microsoft.com/office/powerpoint/2010/main" val="1415075802"/>
+              </p:ext>
+            </p:extLst>
+          </p:nvPr>
+        </p:nvGraphicFramePr>
+        <p:xfrm>
+          <a:off x="962942" y="3849614"/>
+          <a:ext cx="2969859" cy="955674"/>
+        </p:xfrm>
+        <a:graphic>
+          <a:graphicData uri="http://schemas.openxmlformats.org/presentationml/2006/ole">
+            <mc:AlternateContent xmlns:mc="http://schemas.openxmlformats.org/markup-compatibility/2006">
+              <mc:Choice xmlns:v="urn:schemas-microsoft-com:vml" Requires="v">
+                <p:oleObj spid="_x0000_s1042" r:id="rId7" imgW="7656840" imgH="2463480" progId="">
+                  <p:embed/>
+                </p:oleObj>
+              </mc:Choice>
+              <mc:Fallback>
+                <p:oleObj r:id="rId7" imgW="7656840" imgH="2463480" progId="">
+                  <p:embed/>
+                  <p:pic>
+                    <p:nvPicPr>
+                      <p:cNvPr id="0" name=""/>
+                      <p:cNvPicPr/>
+                      <p:nvPr/>
+                    </p:nvPicPr>
+                    <p:blipFill>
+                      <a:blip r:embed="rId8"/>
+                      <a:stretch>
+                        <a:fillRect/>
+                      </a:stretch>
+                    </p:blipFill>
+                    <p:spPr>
+                      <a:xfrm>
+                        <a:off x="962942" y="3849614"/>
+                        <a:ext cx="2969859" cy="955674"/>
+                      </a:xfrm>
+                      <a:prstGeom prst="rect">
+                        <a:avLst/>
+                      </a:prstGeom>
+                    </p:spPr>
+                  </p:pic>
+                </p:oleObj>
+              </mc:Fallback>
+            </mc:AlternateContent>
+          </a:graphicData>
+        </a:graphic>
+      </p:graphicFrame>
     </p:spTree>
     <p:extLst>
       <p:ext uri="{BB962C8B-B14F-4D97-AF65-F5344CB8AC3E}">
@@ -6847,7 +7139,7 @@
                             </p:stCondLst>
                             <p:childTnLst>
                               <p:par>
-                                <p:cTn id="11" presetID="1" presetClass="entr" presetSubtype="0" fill="hold" nodeType="clickEffect">
+                                <p:cTn id="11" presetID="1" presetClass="entr" presetSubtype="0" fill="hold" grpId="0" nodeType="clickEffect">
                                   <p:stCondLst>
                                     <p:cond delay="0"/>
                                   </p:stCondLst>
@@ -6860,7 +7152,7 @@
                                           </p:stCondLst>
                                         </p:cTn>
                                         <p:tgtEl>
-                                          <p:spTgt spid="12"/>
+                                          <p:spTgt spid="13"/>
                                         </p:tgtEl>
                                         <p:attrNameLst>
                                           <p:attrName>style.visibility</p:attrName>
@@ -6874,7 +7166,7 @@
                                 </p:cTn>
                               </p:par>
                               <p:par>
-                                <p:cTn id="13" presetID="1" presetClass="entr" presetSubtype="0" fill="hold" grpId="0" nodeType="withEffect">
+                                <p:cTn id="13" presetID="1" presetClass="entr" presetSubtype="0" fill="hold" nodeType="withEffect">
                                   <p:stCondLst>
                                     <p:cond delay="0"/>
                                   </p:stCondLst>
@@ -6887,7 +7179,7 @@
                                           </p:stCondLst>
                                         </p:cTn>
                                         <p:tgtEl>
-                                          <p:spTgt spid="13"/>
+                                          <p:spTgt spid="7"/>
                                         </p:tgtEl>
                                         <p:attrNameLst>
                                           <p:attrName>style.visibility</p:attrName>
@@ -7048,10 +7340,10 @@
           <a:lstStyle/>
           <a:p>
             <a:r>
-              <a:rPr lang="en-US" sz="3600" dirty="0"/>
+              <a:rPr lang="en-US" sz="3200" dirty="0"/>
               <a:t>Conventional import abbreviations</a:t>
             </a:r>
-            <a:endParaRPr lang="de-CH" sz="3600" dirty="0"/>
+            <a:endParaRPr lang="de-CH" sz="3200" dirty="0"/>
           </a:p>
         </p:txBody>
       </p:sp>
@@ -7067,13 +7359,13 @@
         </p:nvSpPr>
         <p:spPr>
           <a:xfrm>
-            <a:off x="521677" y="1597023"/>
+            <a:off x="838200" y="1366203"/>
             <a:ext cx="10515600" cy="4833083"/>
           </a:xfrm>
         </p:spPr>
         <p:txBody>
           <a:bodyPr>
-            <a:normAutofit/>
+            <a:normAutofit lnSpcReduction="10000"/>
           </a:bodyPr>
           <a:lstStyle/>
           <a:p>
@@ -7238,6 +7530,21 @@
               <a:latin typeface="Consolas" panose="020B0609020204030204" pitchFamily="49" charset="0"/>
               <a:cs typeface="Consolas" panose="020B0609020204030204" pitchFamily="49" charset="0"/>
             </a:endParaRPr>
+          </a:p>
+          <a:p>
+            <a:pPr marL="0" indent="0">
+              <a:buNone/>
+            </a:pPr>
+            <a:endParaRPr lang="en-US" sz="800" dirty="0"/>
+          </a:p>
+          <a:p>
+            <a:pPr marL="0" indent="0">
+              <a:buNone/>
+            </a:pPr>
+            <a:r>
+              <a:rPr lang="en-US" sz="2200" dirty="0"/>
+              <a:t>Please use these abbreviations consistently! If you don’t, it will confuse others who are reading your code…</a:t>
+            </a:r>
           </a:p>
           <a:p>
             <a:pPr marL="0" indent="0">
@@ -7465,7 +7772,7 @@
                                         <p:tgtEl>
                                           <p:spTgt spid="3">
                                             <p:txEl>
-                                              <p:pRg st="4" end="4"/>
+                                              <p:pRg st="6" end="6"/>
                                             </p:txEl>
                                           </p:spTgt>
                                         </p:tgtEl>
@@ -7496,7 +7803,7 @@
                                         <p:tgtEl>
                                           <p:spTgt spid="3">
                                             <p:txEl>
-                                              <p:pRg st="5" end="5"/>
+                                              <p:pRg st="7" end="7"/>
                                             </p:txEl>
                                           </p:spTgt>
                                         </p:tgtEl>
@@ -7527,7 +7834,7 @@
                                         <p:tgtEl>
                                           <p:spTgt spid="3">
                                             <p:txEl>
-                                              <p:pRg st="6" end="6"/>
+                                              <p:pRg st="8" end="8"/>
                                             </p:txEl>
                                           </p:spTgt>
                                         </p:tgtEl>
@@ -7558,7 +7865,7 @@
                                         <p:tgtEl>
                                           <p:spTgt spid="3">
                                             <p:txEl>
-                                              <p:pRg st="7" end="7"/>
+                                              <p:pRg st="9" end="9"/>
                                             </p:txEl>
                                           </p:spTgt>
                                         </p:tgtEl>
@@ -7589,7 +7896,7 @@
                                         <p:tgtEl>
                                           <p:spTgt spid="3">
                                             <p:txEl>
-                                              <p:pRg st="9" end="9"/>
+                                              <p:pRg st="11" end="11"/>
                                             </p:txEl>
                                           </p:spTgt>
                                         </p:tgtEl>

</xml_diff>

<commit_message>
Update files for 2020 course (data handling & analysis)
</commit_message>
<xml_diff>
--- a/data_handling_and_analysis/Python Workshop - Data Handling and Analysis.pptx
+++ b/data_handling_and_analysis/Python Workshop - Data Handling and Analysis.pptx
@@ -272,7 +272,7 @@
           <a:p>
             <a:fld id="{DB2D40D2-DA59-418F-9676-2E287E608FAF}" type="datetimeFigureOut">
               <a:rPr lang="de-CH" smtClean="0"/>
-              <a:t>29.10.2020</a:t>
+              <a:t>30.10.2020</a:t>
             </a:fld>
             <a:endParaRPr lang="de-CH"/>
           </a:p>
@@ -442,7 +442,7 @@
           <a:p>
             <a:fld id="{DB2D40D2-DA59-418F-9676-2E287E608FAF}" type="datetimeFigureOut">
               <a:rPr lang="de-CH" smtClean="0"/>
-              <a:t>29.10.2020</a:t>
+              <a:t>30.10.2020</a:t>
             </a:fld>
             <a:endParaRPr lang="de-CH"/>
           </a:p>
@@ -622,7 +622,7 @@
           <a:p>
             <a:fld id="{DB2D40D2-DA59-418F-9676-2E287E608FAF}" type="datetimeFigureOut">
               <a:rPr lang="de-CH" smtClean="0"/>
-              <a:t>29.10.2020</a:t>
+              <a:t>30.10.2020</a:t>
             </a:fld>
             <a:endParaRPr lang="de-CH"/>
           </a:p>
@@ -792,7 +792,7 @@
           <a:p>
             <a:fld id="{DB2D40D2-DA59-418F-9676-2E287E608FAF}" type="datetimeFigureOut">
               <a:rPr lang="de-CH" smtClean="0"/>
-              <a:t>29.10.2020</a:t>
+              <a:t>30.10.2020</a:t>
             </a:fld>
             <a:endParaRPr lang="de-CH"/>
           </a:p>
@@ -1038,7 +1038,7 @@
           <a:p>
             <a:fld id="{DB2D40D2-DA59-418F-9676-2E287E608FAF}" type="datetimeFigureOut">
               <a:rPr lang="de-CH" smtClean="0"/>
-              <a:t>29.10.2020</a:t>
+              <a:t>30.10.2020</a:t>
             </a:fld>
             <a:endParaRPr lang="de-CH"/>
           </a:p>
@@ -1270,7 +1270,7 @@
           <a:p>
             <a:fld id="{DB2D40D2-DA59-418F-9676-2E287E608FAF}" type="datetimeFigureOut">
               <a:rPr lang="de-CH" smtClean="0"/>
-              <a:t>29.10.2020</a:t>
+              <a:t>30.10.2020</a:t>
             </a:fld>
             <a:endParaRPr lang="de-CH"/>
           </a:p>
@@ -1637,7 +1637,7 @@
           <a:p>
             <a:fld id="{DB2D40D2-DA59-418F-9676-2E287E608FAF}" type="datetimeFigureOut">
               <a:rPr lang="de-CH" smtClean="0"/>
-              <a:t>29.10.2020</a:t>
+              <a:t>30.10.2020</a:t>
             </a:fld>
             <a:endParaRPr lang="de-CH"/>
           </a:p>
@@ -1755,7 +1755,7 @@
           <a:p>
             <a:fld id="{DB2D40D2-DA59-418F-9676-2E287E608FAF}" type="datetimeFigureOut">
               <a:rPr lang="de-CH" smtClean="0"/>
-              <a:t>29.10.2020</a:t>
+              <a:t>30.10.2020</a:t>
             </a:fld>
             <a:endParaRPr lang="de-CH"/>
           </a:p>
@@ -1850,7 +1850,7 @@
           <a:p>
             <a:fld id="{DB2D40D2-DA59-418F-9676-2E287E608FAF}" type="datetimeFigureOut">
               <a:rPr lang="de-CH" smtClean="0"/>
-              <a:t>29.10.2020</a:t>
+              <a:t>30.10.2020</a:t>
             </a:fld>
             <a:endParaRPr lang="de-CH"/>
           </a:p>
@@ -2127,7 +2127,7 @@
           <a:p>
             <a:fld id="{DB2D40D2-DA59-418F-9676-2E287E608FAF}" type="datetimeFigureOut">
               <a:rPr lang="de-CH" smtClean="0"/>
-              <a:t>29.10.2020</a:t>
+              <a:t>30.10.2020</a:t>
             </a:fld>
             <a:endParaRPr lang="de-CH"/>
           </a:p>
@@ -2380,7 +2380,7 @@
           <a:p>
             <a:fld id="{DB2D40D2-DA59-418F-9676-2E287E608FAF}" type="datetimeFigureOut">
               <a:rPr lang="de-CH" smtClean="0"/>
-              <a:t>29.10.2020</a:t>
+              <a:t>30.10.2020</a:t>
             </a:fld>
             <a:endParaRPr lang="de-CH"/>
           </a:p>
@@ -2593,7 +2593,7 @@
           <a:p>
             <a:fld id="{DB2D40D2-DA59-418F-9676-2E287E608FAF}" type="datetimeFigureOut">
               <a:rPr lang="de-CH" smtClean="0"/>
-              <a:t>29.10.2020</a:t>
+              <a:t>30.10.2020</a:t>
             </a:fld>
             <a:endParaRPr lang="de-CH"/>
           </a:p>
@@ -3221,31 +3221,7 @@
             </a:pPr>
             <a:r>
               <a:rPr lang="en-US" dirty="0"/>
-              <a:t>Brief introductions to </a:t>
-            </a:r>
-            <a:r>
-              <a:rPr lang="en-US" dirty="0" err="1"/>
-              <a:t>NumPy</a:t>
-            </a:r>
-            <a:r>
-              <a:rPr lang="en-US" dirty="0"/>
-              <a:t>, </a:t>
-            </a:r>
-            <a:r>
-              <a:rPr lang="en-US" dirty="0" err="1"/>
-              <a:t>SciPy</a:t>
-            </a:r>
-            <a:r>
-              <a:rPr lang="en-US" dirty="0"/>
-              <a:t>, pandas and </a:t>
-            </a:r>
-            <a:r>
-              <a:rPr lang="en-US" dirty="0" err="1"/>
-              <a:t>matplotlib</a:t>
-            </a:r>
-            <a:r>
-              <a:rPr lang="en-US" dirty="0"/>
-              <a:t>,</a:t>
+              <a:t>Brief introductions to NumPy, SciPy, pandas and Matplotlib,</a:t>
             </a:r>
           </a:p>
           <a:p>
@@ -3364,12 +3340,8 @@
               <a:buNone/>
             </a:pPr>
             <a:r>
-              <a:rPr lang="en-US" sz="2400"/>
-              <a:t>For the hands-on </a:t>
-            </a:r>
-            <a:r>
               <a:rPr lang="en-US" sz="2400" dirty="0"/>
-              <a:t>exercise, load the dataset with pandas and explore it:</a:t>
+              <a:t>For the hands-on exercise, load this dataset with pandas and explore it:</a:t>
             </a:r>
             <a:endParaRPr lang="de-CH" sz="2400" dirty="0"/>
           </a:p>
@@ -3624,7 +3596,7 @@
             <a:pPr lvl="1"/>
             <a:r>
               <a:rPr lang="en-US" sz="1800" dirty="0"/>
-              <a:t>You may need to install the required packages: </a:t>
+              <a:t>You may need to install the required packages:  </a:t>
             </a:r>
             <a:r>
               <a:rPr lang="en-US" sz="1800" dirty="0">
@@ -4109,7 +4081,7 @@
         <p:spPr>
           <a:xfrm>
             <a:off x="404446" y="1271953"/>
-            <a:ext cx="4589585" cy="4247317"/>
+            <a:ext cx="4682459" cy="4247317"/>
           </a:xfrm>
           <a:prstGeom prst="rect">
             <a:avLst/>
@@ -4197,7 +4169,7 @@
           <a:p>
             <a:r>
               <a:rPr lang="en-US" dirty="0"/>
-              <a:t>Run from command line: </a:t>
+              <a:t>Run from command line:  </a:t>
             </a:r>
             <a:r>
               <a:rPr lang="en-US" dirty="0" err="1">
@@ -4945,9 +4917,22 @@
                   </a:outerShdw>
                 </a:effectLst>
                 <a:latin typeface="Consolas" panose="020B0609020204030204" pitchFamily="49" charset="0"/>
+              </a:rPr>
+              <a:t>{</a:t>
+            </a:r>
+            <a:r>
+              <a:rPr lang="en-US" altLang="ja-JP" sz="2400" dirty="0">
+                <a:effectLst>
+                  <a:outerShdw blurRad="38100" dist="38100" dir="2700000" algn="tl">
+                    <a:srgbClr val="000000">
+                      <a:alpha val="43137"/>
+                    </a:srgbClr>
+                  </a:outerShdw>
+                </a:effectLst>
+                <a:latin typeface="Consolas" panose="020B0609020204030204" pitchFamily="49" charset="0"/>
                 <a:cs typeface="Consolas" panose="020B0609020204030204" pitchFamily="49" charset="0"/>
               </a:rPr>
-              <a:t>('cow', 'dog', 'horse')</a:t>
+              <a:t>'cow', 'dog', 'horse'}</a:t>
             </a:r>
           </a:p>
           <a:p>
@@ -5612,7 +5597,23 @@
           <a:p>
             <a:r>
               <a:rPr lang="en-US" sz="2200" b="1" dirty="0"/>
-              <a:t>Mutable objects </a:t>
+              <a:t>Mutable objects</a:t>
+            </a:r>
+            <a:r>
+              <a:rPr lang="en-US" sz="2200" dirty="0"/>
+              <a:t>, for example </a:t>
+            </a:r>
+            <a:r>
+              <a:rPr lang="en-US" sz="2200" i="1" dirty="0"/>
+              <a:t>lists</a:t>
+            </a:r>
+            <a:r>
+              <a:rPr lang="en-US" sz="2200" dirty="0"/>
+              <a:t>,</a:t>
+            </a:r>
+            <a:r>
+              <a:rPr lang="en-US" sz="2200" b="1" dirty="0"/>
+              <a:t> </a:t>
             </a:r>
             <a:r>
               <a:rPr lang="en-US" sz="2200" dirty="0"/>
@@ -5626,7 +5627,15 @@
             </a:r>
             <a:r>
               <a:rPr lang="en-US" sz="2200" dirty="0"/>
-              <a:t> cannot be changed, only reassigned to new values. If reassigned, they point to a new location in memory.</a:t>
+              <a:t>, for example </a:t>
+            </a:r>
+            <a:r>
+              <a:rPr lang="en-US" sz="2200" i="1" dirty="0" err="1"/>
+              <a:t>ints</a:t>
+            </a:r>
+            <a:r>
+              <a:rPr lang="en-US" sz="2200" dirty="0"/>
+              <a:t>, cannot be changed, only reassigned to new values. If reassigned, they point to a new location in memory.</a:t>
             </a:r>
           </a:p>
           <a:p>
@@ -6454,7 +6463,7 @@
         </p:nvSpPr>
         <p:spPr>
           <a:xfrm>
-            <a:off x="918554" y="2013833"/>
+            <a:off x="678848" y="2013833"/>
             <a:ext cx="4496818" cy="1692771"/>
           </a:xfrm>
           <a:prstGeom prst="rect">
@@ -6473,16 +6482,22 @@
               <a:t>(pronounced </a:t>
             </a:r>
             <a:r>
-              <a:rPr lang="en-US" sz="1600" i="1" dirty="0" err="1"/>
-              <a:t>Num</a:t>
-            </a:r>
-            <a:r>
               <a:rPr lang="en-US" sz="1600" i="1" dirty="0"/>
-              <a:t> Pie</a:t>
+              <a:t>Num Pie</a:t>
             </a:r>
             <a:r>
               <a:rPr lang="en-US" sz="1600" dirty="0"/>
-              <a:t>) </a:t>
+              <a:t>) – </a:t>
+            </a:r>
+            <a:r>
+              <a:rPr lang="en-US" sz="1600" dirty="0">
+                <a:hlinkClick r:id="rId3"/>
+              </a:rPr>
+              <a:t>https://numpy.org</a:t>
+            </a:r>
+            <a:r>
+              <a:rPr lang="en-US" sz="1600" dirty="0"/>
+              <a:t>   </a:t>
             </a:r>
           </a:p>
           <a:p>
@@ -6543,7 +6558,7 @@
           <p:nvPr/>
         </p:nvPicPr>
         <p:blipFill>
-          <a:blip r:embed="rId3" cstate="print">
+          <a:blip r:embed="rId4" cstate="print">
             <a:extLst>
               <a:ext uri="{28A0092B-C50C-407E-A947-70E740481C1C}">
                 <a14:useLocalDpi xmlns:a14="http://schemas.microsoft.com/office/drawing/2010/main" val="0"/>
@@ -6556,7 +6571,7 @@
         </p:blipFill>
         <p:spPr>
           <a:xfrm>
-            <a:off x="6096000" y="980471"/>
+            <a:off x="6433358" y="980471"/>
             <a:ext cx="2277204" cy="904782"/>
           </a:xfrm>
           <a:prstGeom prst="rect">
@@ -6602,7 +6617,7 @@
         </p:nvSpPr>
         <p:spPr>
           <a:xfrm>
-            <a:off x="6011500" y="2013833"/>
+            <a:off x="6348858" y="2013833"/>
             <a:ext cx="4748235" cy="1887696"/>
           </a:xfrm>
           <a:prstGeom prst="rect">
@@ -6626,7 +6641,17 @@
             </a:r>
             <a:r>
               <a:rPr lang="en-US" sz="1600" dirty="0"/>
-              <a:t>) </a:t>
+              <a:t>) – </a:t>
+            </a:r>
+            <a:r>
+              <a:rPr lang="en-US" sz="1600" dirty="0">
+                <a:hlinkClick r:id="rId5"/>
+              </a:rPr>
+              <a:t>https://www.scipy.org</a:t>
+            </a:r>
+            <a:r>
+              <a:rPr lang="en-US" sz="1600" dirty="0"/>
+              <a:t> </a:t>
             </a:r>
           </a:p>
           <a:p>
@@ -6689,8 +6714,8 @@
         </p:nvSpPr>
         <p:spPr>
           <a:xfrm>
-            <a:off x="918553" y="4841763"/>
-            <a:ext cx="4621113" cy="1672253"/>
+            <a:off x="678847" y="4841763"/>
+            <a:ext cx="5092947" cy="1672253"/>
           </a:xfrm>
           <a:prstGeom prst="rect">
             <a:avLst/>
@@ -6705,7 +6730,7 @@
           <a:p>
             <a:r>
               <a:rPr lang="en-US" sz="1600" dirty="0"/>
-              <a:t>pandas – </a:t>
+              <a:t>pandas (</a:t>
             </a:r>
             <a:r>
               <a:rPr lang="en-US" sz="1600" b="1" dirty="0"/>
@@ -6729,7 +6754,17 @@
             </a:r>
             <a:r>
               <a:rPr lang="en-US" sz="1600" dirty="0"/>
-              <a:t>tructures</a:t>
+              <a:t>tructures) – </a:t>
+            </a:r>
+            <a:r>
+              <a:rPr lang="en-US" sz="1600" dirty="0">
+                <a:hlinkClick r:id="rId6"/>
+              </a:rPr>
+              <a:t>https://pandas.pydata.org</a:t>
+            </a:r>
+            <a:r>
+              <a:rPr lang="en-US" sz="1600" dirty="0"/>
+              <a:t> </a:t>
             </a:r>
           </a:p>
           <a:p>
@@ -6799,7 +6834,7 @@
           <p:nvPr/>
         </p:nvPicPr>
         <p:blipFill>
-          <a:blip r:embed="rId4">
+          <a:blip r:embed="rId7">
             <a:extLst>
               <a:ext uri="{28A0092B-C50C-407E-A947-70E740481C1C}">
                 <a14:useLocalDpi xmlns:a14="http://schemas.microsoft.com/office/drawing/2010/main" val="0"/>
@@ -6812,7 +6847,7 @@
         </p:blipFill>
         <p:spPr>
           <a:xfrm>
-            <a:off x="6069366" y="3951757"/>
+            <a:off x="6406724" y="3951757"/>
             <a:ext cx="2807677" cy="644852"/>
           </a:xfrm>
           <a:prstGeom prst="rect">
@@ -6828,8 +6863,8 @@
         </p:nvSpPr>
         <p:spPr>
           <a:xfrm>
-            <a:off x="6011501" y="4841763"/>
-            <a:ext cx="4558845" cy="1395254"/>
+            <a:off x="6348859" y="4841763"/>
+            <a:ext cx="4558845" cy="1641475"/>
           </a:xfrm>
           <a:prstGeom prst="rect">
             <a:avLst/>
@@ -6841,6 +6876,18 @@
             <a:spAutoFit/>
           </a:bodyPr>
           <a:lstStyle/>
+          <a:p>
+            <a:r>
+              <a:rPr lang="en-US" sz="1600" dirty="0">
+                <a:hlinkClick r:id="rId8"/>
+              </a:rPr>
+              <a:t>https://matplotlib.org</a:t>
+            </a:r>
+            <a:r>
+              <a:rPr lang="en-US" sz="1600" dirty="0"/>
+              <a:t>  </a:t>
+            </a:r>
+          </a:p>
           <a:p>
             <a:r>
               <a:rPr lang="en-US" sz="1600" dirty="0"/>
@@ -6925,25 +6972,25 @@
           <p:nvPr>
             <p:extLst>
               <p:ext uri="{D42A27DB-BD31-4B8C-83A1-F6EECF244321}">
-                <p14:modId xmlns:p14="http://schemas.microsoft.com/office/powerpoint/2010/main" val="712799550"/>
+                <p14:modId xmlns:p14="http://schemas.microsoft.com/office/powerpoint/2010/main" val="3828167311"/>
               </p:ext>
             </p:extLst>
           </p:nvPr>
         </p:nvGraphicFramePr>
         <p:xfrm>
-          <a:off x="945186" y="843045"/>
+          <a:off x="705480" y="843045"/>
           <a:ext cx="2739040" cy="1043444"/>
         </p:xfrm>
         <a:graphic>
           <a:graphicData uri="http://schemas.openxmlformats.org/presentationml/2006/ole">
             <mc:AlternateContent xmlns:mc="http://schemas.openxmlformats.org/markup-compatibility/2006">
               <mc:Choice xmlns:v="urn:schemas-microsoft-com:vml" Requires="v">
-                <p:oleObj spid="_x0000_s1041" r:id="rId5" imgW="11301480" imgH="4304520" progId="">
+                <p:oleObj spid="_x0000_s1049" r:id="rId9" imgW="11301480" imgH="4304520" progId="">
                   <p:embed/>
                 </p:oleObj>
               </mc:Choice>
               <mc:Fallback>
-                <p:oleObj r:id="rId5" imgW="11301480" imgH="4304520" progId="">
+                <p:oleObj r:id="rId9" imgW="11301480" imgH="4304520" progId="">
                   <p:embed/>
                   <p:pic>
                     <p:nvPicPr>
@@ -6952,14 +6999,14 @@
                       <p:nvPr/>
                     </p:nvPicPr>
                     <p:blipFill>
-                      <a:blip r:embed="rId6"/>
+                      <a:blip r:embed="rId10"/>
                       <a:stretch>
                         <a:fillRect/>
                       </a:stretch>
                     </p:blipFill>
                     <p:spPr>
                       <a:xfrm>
-                        <a:off x="945186" y="843045"/>
+                        <a:off x="705480" y="843045"/>
                         <a:ext cx="2739040" cy="1043444"/>
                       </a:xfrm>
                       <a:prstGeom prst="rect">
@@ -6988,25 +7035,25 @@
           <p:nvPr>
             <p:extLst>
               <p:ext uri="{D42A27DB-BD31-4B8C-83A1-F6EECF244321}">
-                <p14:modId xmlns:p14="http://schemas.microsoft.com/office/powerpoint/2010/main" val="1415075802"/>
+                <p14:modId xmlns:p14="http://schemas.microsoft.com/office/powerpoint/2010/main" val="953151941"/>
               </p:ext>
             </p:extLst>
           </p:nvPr>
         </p:nvGraphicFramePr>
         <p:xfrm>
-          <a:off x="962942" y="3849614"/>
+          <a:off x="723236" y="3849614"/>
           <a:ext cx="2969859" cy="955674"/>
         </p:xfrm>
         <a:graphic>
           <a:graphicData uri="http://schemas.openxmlformats.org/presentationml/2006/ole">
             <mc:AlternateContent xmlns:mc="http://schemas.openxmlformats.org/markup-compatibility/2006">
               <mc:Choice xmlns:v="urn:schemas-microsoft-com:vml" Requires="v">
-                <p:oleObj spid="_x0000_s1042" r:id="rId7" imgW="7656840" imgH="2463480" progId="">
+                <p:oleObj spid="_x0000_s1050" r:id="rId11" imgW="7656840" imgH="2463480" progId="">
                   <p:embed/>
                 </p:oleObj>
               </mc:Choice>
               <mc:Fallback>
-                <p:oleObj r:id="rId7" imgW="7656840" imgH="2463480" progId="">
+                <p:oleObj r:id="rId11" imgW="7656840" imgH="2463480" progId="">
                   <p:embed/>
                   <p:pic>
                     <p:nvPicPr>
@@ -7015,14 +7062,14 @@
                       <p:nvPr/>
                     </p:nvPicPr>
                     <p:blipFill>
-                      <a:blip r:embed="rId8"/>
+                      <a:blip r:embed="rId12"/>
                       <a:stretch>
                         <a:fillRect/>
                       </a:stretch>
                     </p:blipFill>
                     <p:spPr>
                       <a:xfrm>
-                        <a:off x="962942" y="3849614"/>
+                        <a:off x="723236" y="3849614"/>
                         <a:ext cx="2969859" cy="955674"/>
                       </a:xfrm>
                       <a:prstGeom prst="rect">
@@ -7558,15 +7605,7 @@
             </a:pPr>
             <a:r>
               <a:rPr lang="en-US" sz="2200" dirty="0"/>
-              <a:t>For </a:t>
-            </a:r>
-            <a:r>
-              <a:rPr lang="en-US" sz="2200" dirty="0" err="1"/>
-              <a:t>scipy</a:t>
-            </a:r>
-            <a:r>
-              <a:rPr lang="en-US" sz="2200" dirty="0"/>
-              <a:t>, just import the module you need, for example:</a:t>
+              <a:t>For SciPy, just import the module you need, for example:</a:t>
             </a:r>
           </a:p>
           <a:p>

</xml_diff>